<commit_message>
icons and deck for pitchwere added
</commit_message>
<xml_diff>
--- a/pitch/deck_pitch.pptx
+++ b/pitch/deck_pitch.pptx
@@ -7,8 +7,9 @@
   <p:sldIdLst>
     <p:sldId id="256" r:id="rId2"/>
     <p:sldId id="257" r:id="rId3"/>
-    <p:sldId id="259" r:id="rId4"/>
-    <p:sldId id="258" r:id="rId5"/>
+    <p:sldId id="261" r:id="rId4"/>
+    <p:sldId id="262" r:id="rId5"/>
+    <p:sldId id="258" r:id="rId6"/>
   </p:sldIdLst>
   <p:sldSz cx="9144000" cy="6858000" type="screen4x3"/>
   <p:notesSz cx="6858000" cy="9144000"/>
@@ -291,7 +292,7 @@
           <a:p>
             <a:fld id="{9477C11D-0EEB-42D9-ABE2-305E74078163}" type="datetimeFigureOut">
               <a:rPr lang="en-GB" smtClean="0"/>
-              <a:t>06/11/2020</a:t>
+              <a:t>07/11/2020</a:t>
             </a:fld>
             <a:endParaRPr lang="en-GB"/>
           </a:p>
@@ -461,7 +462,7 @@
           <a:p>
             <a:fld id="{9477C11D-0EEB-42D9-ABE2-305E74078163}" type="datetimeFigureOut">
               <a:rPr lang="en-GB" smtClean="0"/>
-              <a:t>06/11/2020</a:t>
+              <a:t>07/11/2020</a:t>
             </a:fld>
             <a:endParaRPr lang="en-GB"/>
           </a:p>
@@ -641,7 +642,7 @@
           <a:p>
             <a:fld id="{9477C11D-0EEB-42D9-ABE2-305E74078163}" type="datetimeFigureOut">
               <a:rPr lang="en-GB" smtClean="0"/>
-              <a:t>06/11/2020</a:t>
+              <a:t>07/11/2020</a:t>
             </a:fld>
             <a:endParaRPr lang="en-GB"/>
           </a:p>
@@ -811,7 +812,7 @@
           <a:p>
             <a:fld id="{9477C11D-0EEB-42D9-ABE2-305E74078163}" type="datetimeFigureOut">
               <a:rPr lang="en-GB" smtClean="0"/>
-              <a:t>06/11/2020</a:t>
+              <a:t>07/11/2020</a:t>
             </a:fld>
             <a:endParaRPr lang="en-GB"/>
           </a:p>
@@ -1057,7 +1058,7 @@
           <a:p>
             <a:fld id="{9477C11D-0EEB-42D9-ABE2-305E74078163}" type="datetimeFigureOut">
               <a:rPr lang="en-GB" smtClean="0"/>
-              <a:t>06/11/2020</a:t>
+              <a:t>07/11/2020</a:t>
             </a:fld>
             <a:endParaRPr lang="en-GB"/>
           </a:p>
@@ -1345,7 +1346,7 @@
           <a:p>
             <a:fld id="{9477C11D-0EEB-42D9-ABE2-305E74078163}" type="datetimeFigureOut">
               <a:rPr lang="en-GB" smtClean="0"/>
-              <a:t>06/11/2020</a:t>
+              <a:t>07/11/2020</a:t>
             </a:fld>
             <a:endParaRPr lang="en-GB"/>
           </a:p>
@@ -1767,7 +1768,7 @@
           <a:p>
             <a:fld id="{9477C11D-0EEB-42D9-ABE2-305E74078163}" type="datetimeFigureOut">
               <a:rPr lang="en-GB" smtClean="0"/>
-              <a:t>06/11/2020</a:t>
+              <a:t>07/11/2020</a:t>
             </a:fld>
             <a:endParaRPr lang="en-GB"/>
           </a:p>
@@ -1885,7 +1886,7 @@
           <a:p>
             <a:fld id="{9477C11D-0EEB-42D9-ABE2-305E74078163}" type="datetimeFigureOut">
               <a:rPr lang="en-GB" smtClean="0"/>
-              <a:t>06/11/2020</a:t>
+              <a:t>07/11/2020</a:t>
             </a:fld>
             <a:endParaRPr lang="en-GB"/>
           </a:p>
@@ -1980,7 +1981,7 @@
           <a:p>
             <a:fld id="{9477C11D-0EEB-42D9-ABE2-305E74078163}" type="datetimeFigureOut">
               <a:rPr lang="en-GB" smtClean="0"/>
-              <a:t>06/11/2020</a:t>
+              <a:t>07/11/2020</a:t>
             </a:fld>
             <a:endParaRPr lang="en-GB"/>
           </a:p>
@@ -2257,7 +2258,7 @@
           <a:p>
             <a:fld id="{9477C11D-0EEB-42D9-ABE2-305E74078163}" type="datetimeFigureOut">
               <a:rPr lang="en-GB" smtClean="0"/>
-              <a:t>06/11/2020</a:t>
+              <a:t>07/11/2020</a:t>
             </a:fld>
             <a:endParaRPr lang="en-GB"/>
           </a:p>
@@ -2510,7 +2511,7 @@
           <a:p>
             <a:fld id="{9477C11D-0EEB-42D9-ABE2-305E74078163}" type="datetimeFigureOut">
               <a:rPr lang="en-GB" smtClean="0"/>
-              <a:t>06/11/2020</a:t>
+              <a:t>07/11/2020</a:t>
             </a:fld>
             <a:endParaRPr lang="en-GB"/>
           </a:p>
@@ -2723,7 +2724,7 @@
           <a:p>
             <a:fld id="{9477C11D-0EEB-42D9-ABE2-305E74078163}" type="datetimeFigureOut">
               <a:rPr lang="en-GB" smtClean="0"/>
-              <a:t>06/11/2020</a:t>
+              <a:t>07/11/2020</a:t>
             </a:fld>
             <a:endParaRPr lang="en-GB"/>
           </a:p>
@@ -3492,20 +3493,2664 @@
           <a:chExt cx="0" cy="0"/>
         </a:xfrm>
       </p:grpSpPr>
+      <p:pic>
+        <p:nvPicPr>
+          <p:cNvPr id="2" name="Picture 2" descr="C:\Users\AKononov\Documents\GitHub\DocRefConsulter\logo_name.png"/>
+          <p:cNvPicPr>
+            <a:picLocks noChangeAspect="1" noChangeArrowheads="1"/>
+          </p:cNvPicPr>
+          <p:nvPr/>
+        </p:nvPicPr>
+        <p:blipFill>
+          <a:blip r:embed="rId2">
+            <a:extLst>
+              <a:ext uri="{28A0092B-C50C-407E-A947-70E740481C1C}">
+                <a14:useLocalDpi xmlns:a14="http://schemas.microsoft.com/office/drawing/2010/main" val="0"/>
+              </a:ext>
+            </a:extLst>
+          </a:blip>
+          <a:srcRect/>
+          <a:stretch>
+            <a:fillRect/>
+          </a:stretch>
+        </p:blipFill>
+        <p:spPr bwMode="auto">
+          <a:xfrm>
+            <a:off x="5846390" y="5856271"/>
+            <a:ext cx="3096964" cy="731240"/>
+          </a:xfrm>
+          <a:prstGeom prst="rect">
+            <a:avLst/>
+          </a:prstGeom>
+          <a:noFill/>
+          <a:extLst>
+            <a:ext uri="{909E8E84-426E-40DD-AFC4-6F175D3DCCD1}">
+              <a14:hiddenFill xmlns:a14="http://schemas.microsoft.com/office/drawing/2010/main">
+                <a:solidFill>
+                  <a:srgbClr val="FFFFFF"/>
+                </a:solidFill>
+              </a14:hiddenFill>
+            </a:ext>
+          </a:extLst>
+        </p:spPr>
+      </p:pic>
+      <p:pic>
+        <p:nvPicPr>
+          <p:cNvPr id="1026" name="Picture 2" descr="C:\Users\AKononov\Documents\GitHub\DocRefConsulter\user_logo.png"/>
+          <p:cNvPicPr>
+            <a:picLocks noChangeAspect="1" noChangeArrowheads="1"/>
+          </p:cNvPicPr>
+          <p:nvPr/>
+        </p:nvPicPr>
+        <p:blipFill>
+          <a:blip r:embed="rId3">
+            <a:extLst>
+              <a:ext uri="{28A0092B-C50C-407E-A947-70E740481C1C}">
+                <a14:useLocalDpi xmlns:a14="http://schemas.microsoft.com/office/drawing/2010/main" val="0"/>
+              </a:ext>
+            </a:extLst>
+          </a:blip>
+          <a:srcRect/>
+          <a:stretch>
+            <a:fillRect/>
+          </a:stretch>
+        </p:blipFill>
+        <p:spPr bwMode="auto">
+          <a:xfrm>
+            <a:off x="1475656" y="2996952"/>
+            <a:ext cx="438150" cy="904875"/>
+          </a:xfrm>
+          <a:prstGeom prst="rect">
+            <a:avLst/>
+          </a:prstGeom>
+          <a:noFill/>
+          <a:extLst>
+            <a:ext uri="{909E8E84-426E-40DD-AFC4-6F175D3DCCD1}">
+              <a14:hiddenFill xmlns:a14="http://schemas.microsoft.com/office/drawing/2010/main">
+                <a:solidFill>
+                  <a:srgbClr val="FFFFFF"/>
+                </a:solidFill>
+              </a14:hiddenFill>
+            </a:ext>
+          </a:extLst>
+        </p:spPr>
+      </p:pic>
+      <p:pic>
+        <p:nvPicPr>
+          <p:cNvPr id="10" name="Picture 2" descr="C:\Users\AKononov\Documents\GitHub\DocRefConsulter\user_logo.png"/>
+          <p:cNvPicPr>
+            <a:picLocks noChangeAspect="1" noChangeArrowheads="1"/>
+          </p:cNvPicPr>
+          <p:nvPr/>
+        </p:nvPicPr>
+        <p:blipFill>
+          <a:blip r:embed="rId3">
+            <a:extLst>
+              <a:ext uri="{28A0092B-C50C-407E-A947-70E740481C1C}">
+                <a14:useLocalDpi xmlns:a14="http://schemas.microsoft.com/office/drawing/2010/main" val="0"/>
+              </a:ext>
+            </a:extLst>
+          </a:blip>
+          <a:srcRect/>
+          <a:stretch>
+            <a:fillRect/>
+          </a:stretch>
+        </p:blipFill>
+        <p:spPr bwMode="auto">
+          <a:xfrm>
+            <a:off x="1844750" y="1556792"/>
+            <a:ext cx="438150" cy="904875"/>
+          </a:xfrm>
+          <a:prstGeom prst="rect">
+            <a:avLst/>
+          </a:prstGeom>
+          <a:noFill/>
+          <a:extLst>
+            <a:ext uri="{909E8E84-426E-40DD-AFC4-6F175D3DCCD1}">
+              <a14:hiddenFill xmlns:a14="http://schemas.microsoft.com/office/drawing/2010/main">
+                <a:solidFill>
+                  <a:srgbClr val="FFFFFF"/>
+                </a:solidFill>
+              </a14:hiddenFill>
+            </a:ext>
+          </a:extLst>
+        </p:spPr>
+      </p:pic>
+      <p:pic>
+        <p:nvPicPr>
+          <p:cNvPr id="11" name="Picture 2" descr="C:\Users\AKononov\Documents\GitHub\DocRefConsulter\user_logo.png"/>
+          <p:cNvPicPr>
+            <a:picLocks noChangeAspect="1" noChangeArrowheads="1"/>
+          </p:cNvPicPr>
+          <p:nvPr/>
+        </p:nvPicPr>
+        <p:blipFill>
+          <a:blip r:embed="rId3">
+            <a:extLst>
+              <a:ext uri="{28A0092B-C50C-407E-A947-70E740481C1C}">
+                <a14:useLocalDpi xmlns:a14="http://schemas.microsoft.com/office/drawing/2010/main" val="0"/>
+              </a:ext>
+            </a:extLst>
+          </a:blip>
+          <a:srcRect/>
+          <a:stretch>
+            <a:fillRect/>
+          </a:stretch>
+        </p:blipFill>
+        <p:spPr bwMode="auto">
+          <a:xfrm>
+            <a:off x="1804268" y="4365104"/>
+            <a:ext cx="438150" cy="904875"/>
+          </a:xfrm>
+          <a:prstGeom prst="rect">
+            <a:avLst/>
+          </a:prstGeom>
+          <a:noFill/>
+          <a:extLst>
+            <a:ext uri="{909E8E84-426E-40DD-AFC4-6F175D3DCCD1}">
+              <a14:hiddenFill xmlns:a14="http://schemas.microsoft.com/office/drawing/2010/main">
+                <a:solidFill>
+                  <a:srgbClr val="FFFFFF"/>
+                </a:solidFill>
+              </a14:hiddenFill>
+            </a:ext>
+          </a:extLst>
+        </p:spPr>
+      </p:pic>
+      <p:pic>
+        <p:nvPicPr>
+          <p:cNvPr id="1028" name="Picture 4" descr="C:\Users\AKononov\Documents\GitHub\DocRefConsulter\logo_scratch.png"/>
+          <p:cNvPicPr>
+            <a:picLocks noChangeAspect="1" noChangeArrowheads="1"/>
+          </p:cNvPicPr>
+          <p:nvPr/>
+        </p:nvPicPr>
+        <p:blipFill>
+          <a:blip r:embed="rId4" cstate="print">
+            <a:extLst>
+              <a:ext uri="{28A0092B-C50C-407E-A947-70E740481C1C}">
+                <a14:useLocalDpi xmlns:a14="http://schemas.microsoft.com/office/drawing/2010/main" val="0"/>
+              </a:ext>
+            </a:extLst>
+          </a:blip>
+          <a:srcRect/>
+          <a:stretch>
+            <a:fillRect/>
+          </a:stretch>
+        </p:blipFill>
+        <p:spPr bwMode="auto">
+          <a:xfrm>
+            <a:off x="2066876" y="4932697"/>
+            <a:ext cx="432048" cy="427167"/>
+          </a:xfrm>
+          <a:prstGeom prst="rect">
+            <a:avLst/>
+          </a:prstGeom>
+          <a:noFill/>
+          <a:extLst>
+            <a:ext uri="{909E8E84-426E-40DD-AFC4-6F175D3DCCD1}">
+              <a14:hiddenFill xmlns:a14="http://schemas.microsoft.com/office/drawing/2010/main">
+                <a:solidFill>
+                  <a:srgbClr val="FFFFFF"/>
+                </a:solidFill>
+              </a14:hiddenFill>
+            </a:ext>
+          </a:extLst>
+        </p:spPr>
+      </p:pic>
+      <p:pic>
+        <p:nvPicPr>
+          <p:cNvPr id="13" name="Picture 4" descr="C:\Users\AKononov\Documents\GitHub\DocRefConsulter\logo_scratch.png"/>
+          <p:cNvPicPr>
+            <a:picLocks noChangeAspect="1" noChangeArrowheads="1"/>
+          </p:cNvPicPr>
+          <p:nvPr/>
+        </p:nvPicPr>
+        <p:blipFill>
+          <a:blip r:embed="rId4" cstate="print">
+            <a:extLst>
+              <a:ext uri="{28A0092B-C50C-407E-A947-70E740481C1C}">
+                <a14:useLocalDpi xmlns:a14="http://schemas.microsoft.com/office/drawing/2010/main" val="0"/>
+              </a:ext>
+            </a:extLst>
+          </a:blip>
+          <a:srcRect/>
+          <a:stretch>
+            <a:fillRect/>
+          </a:stretch>
+        </p:blipFill>
+        <p:spPr bwMode="auto">
+          <a:xfrm>
+            <a:off x="1787228" y="3573016"/>
+            <a:ext cx="432048" cy="427167"/>
+          </a:xfrm>
+          <a:prstGeom prst="rect">
+            <a:avLst/>
+          </a:prstGeom>
+          <a:noFill/>
+          <a:extLst>
+            <a:ext uri="{909E8E84-426E-40DD-AFC4-6F175D3DCCD1}">
+              <a14:hiddenFill xmlns:a14="http://schemas.microsoft.com/office/drawing/2010/main">
+                <a:solidFill>
+                  <a:srgbClr val="FFFFFF"/>
+                </a:solidFill>
+              </a14:hiddenFill>
+            </a:ext>
+          </a:extLst>
+        </p:spPr>
+      </p:pic>
+      <p:pic>
+        <p:nvPicPr>
+          <p:cNvPr id="14" name="Picture 4" descr="C:\Users\AKononov\Documents\GitHub\DocRefConsulter\logo_scratch.png"/>
+          <p:cNvPicPr>
+            <a:picLocks noChangeAspect="1" noChangeArrowheads="1"/>
+          </p:cNvPicPr>
+          <p:nvPr/>
+        </p:nvPicPr>
+        <p:blipFill>
+          <a:blip r:embed="rId4" cstate="print">
+            <a:extLst>
+              <a:ext uri="{28A0092B-C50C-407E-A947-70E740481C1C}">
+                <a14:useLocalDpi xmlns:a14="http://schemas.microsoft.com/office/drawing/2010/main" val="0"/>
+              </a:ext>
+            </a:extLst>
+          </a:blip>
+          <a:srcRect/>
+          <a:stretch>
+            <a:fillRect/>
+          </a:stretch>
+        </p:blipFill>
+        <p:spPr bwMode="auto">
+          <a:xfrm>
+            <a:off x="2146127" y="2204864"/>
+            <a:ext cx="432048" cy="427167"/>
+          </a:xfrm>
+          <a:prstGeom prst="rect">
+            <a:avLst/>
+          </a:prstGeom>
+          <a:noFill/>
+          <a:extLst>
+            <a:ext uri="{909E8E84-426E-40DD-AFC4-6F175D3DCCD1}">
+              <a14:hiddenFill xmlns:a14="http://schemas.microsoft.com/office/drawing/2010/main">
+                <a:solidFill>
+                  <a:srgbClr val="FFFFFF"/>
+                </a:solidFill>
+              </a14:hiddenFill>
+            </a:ext>
+          </a:extLst>
+        </p:spPr>
+      </p:pic>
+      <p:pic>
+        <p:nvPicPr>
+          <p:cNvPr id="1029" name="Picture 5" descr="C:\Users\AKononov\Documents\GitHub\DocRefConsulter\db_logo.png"/>
+          <p:cNvPicPr>
+            <a:picLocks noChangeAspect="1" noChangeArrowheads="1"/>
+          </p:cNvPicPr>
+          <p:nvPr/>
+        </p:nvPicPr>
+        <p:blipFill>
+          <a:blip r:embed="rId5" cstate="print">
+            <a:extLst>
+              <a:ext uri="{28A0092B-C50C-407E-A947-70E740481C1C}">
+                <a14:useLocalDpi xmlns:a14="http://schemas.microsoft.com/office/drawing/2010/main" val="0"/>
+              </a:ext>
+            </a:extLst>
+          </a:blip>
+          <a:srcRect/>
+          <a:stretch>
+            <a:fillRect/>
+          </a:stretch>
+        </p:blipFill>
+        <p:spPr bwMode="auto">
+          <a:xfrm>
+            <a:off x="6620570" y="2780928"/>
+            <a:ext cx="918370" cy="918370"/>
+          </a:xfrm>
+          <a:prstGeom prst="rect">
+            <a:avLst/>
+          </a:prstGeom>
+          <a:noFill/>
+          <a:extLst>
+            <a:ext uri="{909E8E84-426E-40DD-AFC4-6F175D3DCCD1}">
+              <a14:hiddenFill xmlns:a14="http://schemas.microsoft.com/office/drawing/2010/main">
+                <a:solidFill>
+                  <a:srgbClr val="FFFFFF"/>
+                </a:solidFill>
+              </a14:hiddenFill>
+            </a:ext>
+          </a:extLst>
+        </p:spPr>
+      </p:pic>
+      <p:pic>
+        <p:nvPicPr>
+          <p:cNvPr id="1030" name="Picture 6" descr="C:\Users\AKononov\Documents\GitHub\DocRefConsulter\browser-window-vector-7.png"/>
+          <p:cNvPicPr>
+            <a:picLocks noChangeAspect="1" noChangeArrowheads="1"/>
+          </p:cNvPicPr>
+          <p:nvPr/>
+        </p:nvPicPr>
+        <p:blipFill>
+          <a:blip r:embed="rId6" cstate="print">
+            <a:extLst>
+              <a:ext uri="{28A0092B-C50C-407E-A947-70E740481C1C}">
+                <a14:useLocalDpi xmlns:a14="http://schemas.microsoft.com/office/drawing/2010/main" val="0"/>
+              </a:ext>
+            </a:extLst>
+          </a:blip>
+          <a:srcRect/>
+          <a:stretch>
+            <a:fillRect/>
+          </a:stretch>
+        </p:blipFill>
+        <p:spPr bwMode="auto">
+          <a:xfrm>
+            <a:off x="4100290" y="836712"/>
+            <a:ext cx="936104" cy="936104"/>
+          </a:xfrm>
+          <a:prstGeom prst="rect">
+            <a:avLst/>
+          </a:prstGeom>
+          <a:noFill/>
+          <a:extLst>
+            <a:ext uri="{909E8E84-426E-40DD-AFC4-6F175D3DCCD1}">
+              <a14:hiddenFill xmlns:a14="http://schemas.microsoft.com/office/drawing/2010/main">
+                <a:solidFill>
+                  <a:srgbClr val="FFFFFF"/>
+                </a:solidFill>
+              </a14:hiddenFill>
+            </a:ext>
+          </a:extLst>
+        </p:spPr>
+      </p:pic>
+      <p:grpSp>
+        <p:nvGrpSpPr>
+          <p:cNvPr id="30" name="Group 29"/>
+          <p:cNvGrpSpPr/>
+          <p:nvPr/>
+        </p:nvGrpSpPr>
+        <p:grpSpPr>
+          <a:xfrm>
+            <a:off x="2219276" y="1304764"/>
+            <a:ext cx="2349066" cy="3276364"/>
+            <a:chOff x="1250826" y="1304764"/>
+            <a:chExt cx="2349066" cy="3276364"/>
+          </a:xfrm>
+        </p:grpSpPr>
+        <p:cxnSp>
+          <p:nvCxnSpPr>
+            <p:cNvPr id="21" name="Straight Arrow Connector 20"/>
+            <p:cNvCxnSpPr/>
+            <p:nvPr/>
+          </p:nvCxnSpPr>
+          <p:spPr>
+            <a:xfrm flipH="1">
+              <a:off x="1530474" y="1304764"/>
+              <a:ext cx="1385342" cy="396044"/>
+            </a:xfrm>
+            <a:prstGeom prst="straightConnector1">
+              <a:avLst/>
+            </a:prstGeom>
+            <a:ln w="38100">
+              <a:tailEnd type="arrow"/>
+            </a:ln>
+          </p:spPr>
+          <p:style>
+            <a:lnRef idx="1">
+              <a:schemeClr val="dk1"/>
+            </a:lnRef>
+            <a:fillRef idx="0">
+              <a:schemeClr val="dk1"/>
+            </a:fillRef>
+            <a:effectRef idx="0">
+              <a:schemeClr val="dk1"/>
+            </a:effectRef>
+            <a:fontRef idx="minor">
+              <a:schemeClr val="tx1"/>
+            </a:fontRef>
+          </p:style>
+        </p:cxnSp>
+        <p:cxnSp>
+          <p:nvCxnSpPr>
+            <p:cNvPr id="23" name="Straight Arrow Connector 22"/>
+            <p:cNvCxnSpPr/>
+            <p:nvPr/>
+          </p:nvCxnSpPr>
+          <p:spPr>
+            <a:xfrm flipH="1">
+              <a:off x="1250826" y="1772816"/>
+              <a:ext cx="1953022" cy="1467297"/>
+            </a:xfrm>
+            <a:prstGeom prst="straightConnector1">
+              <a:avLst/>
+            </a:prstGeom>
+            <a:ln w="38100">
+              <a:solidFill>
+                <a:schemeClr val="tx1"/>
+              </a:solidFill>
+              <a:tailEnd type="arrow"/>
+            </a:ln>
+          </p:spPr>
+          <p:style>
+            <a:lnRef idx="1">
+              <a:schemeClr val="accent1"/>
+            </a:lnRef>
+            <a:fillRef idx="0">
+              <a:schemeClr val="accent1"/>
+            </a:fillRef>
+            <a:effectRef idx="0">
+              <a:schemeClr val="accent1"/>
+            </a:effectRef>
+            <a:fontRef idx="minor">
+              <a:schemeClr val="tx1"/>
+            </a:fontRef>
+          </p:style>
+        </p:cxnSp>
+        <p:cxnSp>
+          <p:nvCxnSpPr>
+            <p:cNvPr id="25" name="Straight Arrow Connector 24"/>
+            <p:cNvCxnSpPr/>
+            <p:nvPr/>
+          </p:nvCxnSpPr>
+          <p:spPr>
+            <a:xfrm flipH="1">
+              <a:off x="1530474" y="1844824"/>
+              <a:ext cx="2069418" cy="2736304"/>
+            </a:xfrm>
+            <a:prstGeom prst="straightConnector1">
+              <a:avLst/>
+            </a:prstGeom>
+            <a:ln w="38100">
+              <a:solidFill>
+                <a:schemeClr val="tx1"/>
+              </a:solidFill>
+              <a:tailEnd type="arrow"/>
+            </a:ln>
+          </p:spPr>
+          <p:style>
+            <a:lnRef idx="1">
+              <a:schemeClr val="dk1"/>
+            </a:lnRef>
+            <a:fillRef idx="0">
+              <a:schemeClr val="dk1"/>
+            </a:fillRef>
+            <a:effectRef idx="0">
+              <a:schemeClr val="dk1"/>
+            </a:effectRef>
+            <a:fontRef idx="minor">
+              <a:schemeClr val="tx1"/>
+            </a:fontRef>
+          </p:style>
+        </p:cxnSp>
+      </p:grpSp>
+      <p:grpSp>
+        <p:nvGrpSpPr>
+          <p:cNvPr id="31" name="Group 30"/>
+          <p:cNvGrpSpPr/>
+          <p:nvPr/>
+        </p:nvGrpSpPr>
+        <p:grpSpPr>
+          <a:xfrm>
+            <a:off x="2498924" y="2132856"/>
+            <a:ext cx="4121646" cy="3013424"/>
+            <a:chOff x="1530474" y="2132856"/>
+            <a:chExt cx="4121646" cy="3013424"/>
+          </a:xfrm>
+        </p:grpSpPr>
+        <p:cxnSp>
+          <p:nvCxnSpPr>
+            <p:cNvPr id="17" name="Straight Arrow Connector 16"/>
+            <p:cNvCxnSpPr/>
+            <p:nvPr/>
+          </p:nvCxnSpPr>
+          <p:spPr>
+            <a:xfrm flipV="1">
+              <a:off x="1726994" y="3690144"/>
+              <a:ext cx="3925126" cy="1456136"/>
+            </a:xfrm>
+            <a:prstGeom prst="straightConnector1">
+              <a:avLst/>
+            </a:prstGeom>
+            <a:ln w="38100">
+              <a:tailEnd type="arrow"/>
+            </a:ln>
+          </p:spPr>
+          <p:style>
+            <a:lnRef idx="1">
+              <a:schemeClr val="dk1"/>
+            </a:lnRef>
+            <a:fillRef idx="0">
+              <a:schemeClr val="dk1"/>
+            </a:fillRef>
+            <a:effectRef idx="0">
+              <a:schemeClr val="dk1"/>
+            </a:effectRef>
+            <a:fontRef idx="minor">
+              <a:schemeClr val="tx1"/>
+            </a:fontRef>
+          </p:style>
+        </p:cxnSp>
+        <p:cxnSp>
+          <p:nvCxnSpPr>
+            <p:cNvPr id="27" name="Straight Arrow Connector 26"/>
+            <p:cNvCxnSpPr/>
+            <p:nvPr/>
+          </p:nvCxnSpPr>
+          <p:spPr>
+            <a:xfrm flipV="1">
+              <a:off x="1530474" y="3356992"/>
+              <a:ext cx="3761606" cy="288032"/>
+            </a:xfrm>
+            <a:prstGeom prst="straightConnector1">
+              <a:avLst/>
+            </a:prstGeom>
+            <a:ln w="38100">
+              <a:solidFill>
+                <a:schemeClr val="tx1"/>
+              </a:solidFill>
+              <a:tailEnd type="arrow"/>
+            </a:ln>
+          </p:spPr>
+          <p:style>
+            <a:lnRef idx="1">
+              <a:schemeClr val="accent1"/>
+            </a:lnRef>
+            <a:fillRef idx="0">
+              <a:schemeClr val="accent1"/>
+            </a:fillRef>
+            <a:effectRef idx="0">
+              <a:schemeClr val="accent1"/>
+            </a:effectRef>
+            <a:fontRef idx="minor">
+              <a:schemeClr val="tx1"/>
+            </a:fontRef>
+          </p:style>
+        </p:cxnSp>
+        <p:cxnSp>
+          <p:nvCxnSpPr>
+            <p:cNvPr id="33" name="Straight Arrow Connector 32"/>
+            <p:cNvCxnSpPr/>
+            <p:nvPr/>
+          </p:nvCxnSpPr>
+          <p:spPr>
+            <a:xfrm>
+              <a:off x="1763688" y="2132856"/>
+              <a:ext cx="3600400" cy="864096"/>
+            </a:xfrm>
+            <a:prstGeom prst="straightConnector1">
+              <a:avLst/>
+            </a:prstGeom>
+            <a:ln w="38100">
+              <a:solidFill>
+                <a:schemeClr val="tx1"/>
+              </a:solidFill>
+              <a:tailEnd type="arrow"/>
+            </a:ln>
+          </p:spPr>
+          <p:style>
+            <a:lnRef idx="1">
+              <a:schemeClr val="accent1"/>
+            </a:lnRef>
+            <a:fillRef idx="0">
+              <a:schemeClr val="accent1"/>
+            </a:fillRef>
+            <a:effectRef idx="0">
+              <a:schemeClr val="accent1"/>
+            </a:effectRef>
+            <a:fontRef idx="minor">
+              <a:schemeClr val="tx1"/>
+            </a:fontRef>
+          </p:style>
+        </p:cxnSp>
+      </p:grpSp>
+      <p:pic>
+        <p:nvPicPr>
+          <p:cNvPr id="36" name="Picture 4" descr="C:\Users\AKononov\Documents\GitHub\DocRefConsulter\logo_scratch.png"/>
+          <p:cNvPicPr>
+            <a:picLocks noChangeAspect="1" noChangeArrowheads="1"/>
+          </p:cNvPicPr>
+          <p:nvPr/>
+        </p:nvPicPr>
+        <p:blipFill>
+          <a:blip r:embed="rId7" cstate="print">
+            <a:extLst>
+              <a:ext uri="{28A0092B-C50C-407E-A947-70E740481C1C}">
+                <a14:useLocalDpi xmlns:a14="http://schemas.microsoft.com/office/drawing/2010/main" val="0"/>
+              </a:ext>
+            </a:extLst>
+          </a:blip>
+          <a:srcRect/>
+          <a:stretch>
+            <a:fillRect/>
+          </a:stretch>
+        </p:blipFill>
+        <p:spPr bwMode="auto">
+          <a:xfrm>
+            <a:off x="6814840" y="2435313"/>
+            <a:ext cx="593798" cy="587088"/>
+          </a:xfrm>
+          <a:prstGeom prst="rect">
+            <a:avLst/>
+          </a:prstGeom>
+          <a:noFill/>
+          <a:extLst>
+            <a:ext uri="{909E8E84-426E-40DD-AFC4-6F175D3DCCD1}">
+              <a14:hiddenFill xmlns:a14="http://schemas.microsoft.com/office/drawing/2010/main">
+                <a:solidFill>
+                  <a:srgbClr val="FFFFFF"/>
+                </a:solidFill>
+              </a14:hiddenFill>
+            </a:ext>
+          </a:extLst>
+        </p:spPr>
+      </p:pic>
     </p:spTree>
     <p:extLst>
       <p:ext uri="{BB962C8B-B14F-4D97-AF65-F5344CB8AC3E}">
-        <p14:creationId xmlns:p14="http://schemas.microsoft.com/office/powerpoint/2010/main" val="3228103091"/>
+        <p14:creationId xmlns:p14="http://schemas.microsoft.com/office/powerpoint/2010/main" val="116815030"/>
       </p:ext>
     </p:extLst>
   </p:cSld>
   <p:clrMapOvr>
     <a:masterClrMapping/>
   </p:clrMapOvr>
+  <p:timing>
+    <p:tnLst>
+      <p:par>
+        <p:cTn id="1" dur="indefinite" restart="never" nodeType="tmRoot">
+          <p:childTnLst>
+            <p:seq concurrent="1" nextAc="seek">
+              <p:cTn id="2" dur="indefinite" nodeType="mainSeq">
+                <p:childTnLst>
+                  <p:par>
+                    <p:cTn id="3" fill="hold">
+                      <p:stCondLst>
+                        <p:cond delay="indefinite"/>
+                      </p:stCondLst>
+                      <p:childTnLst>
+                        <p:par>
+                          <p:cTn id="4" fill="hold">
+                            <p:stCondLst>
+                              <p:cond delay="0"/>
+                            </p:stCondLst>
+                            <p:childTnLst>
+                              <p:par>
+                                <p:cTn id="5" presetID="22" presetClass="entr" presetSubtype="2" fill="hold" nodeType="clickEffect">
+                                  <p:stCondLst>
+                                    <p:cond delay="0"/>
+                                  </p:stCondLst>
+                                  <p:childTnLst>
+                                    <p:set>
+                                      <p:cBhvr>
+                                        <p:cTn id="6" dur="1" fill="hold">
+                                          <p:stCondLst>
+                                            <p:cond delay="0"/>
+                                          </p:stCondLst>
+                                        </p:cTn>
+                                        <p:tgtEl>
+                                          <p:spTgt spid="30"/>
+                                        </p:tgtEl>
+                                        <p:attrNameLst>
+                                          <p:attrName>style.visibility</p:attrName>
+                                        </p:attrNameLst>
+                                      </p:cBhvr>
+                                      <p:to>
+                                        <p:strVal val="visible"/>
+                                      </p:to>
+                                    </p:set>
+                                    <p:animEffect transition="in" filter="wipe(right)">
+                                      <p:cBhvr>
+                                        <p:cTn id="7" dur="500"/>
+                                        <p:tgtEl>
+                                          <p:spTgt spid="30"/>
+                                        </p:tgtEl>
+                                      </p:cBhvr>
+                                    </p:animEffect>
+                                  </p:childTnLst>
+                                </p:cTn>
+                              </p:par>
+                            </p:childTnLst>
+                          </p:cTn>
+                        </p:par>
+                      </p:childTnLst>
+                    </p:cTn>
+                  </p:par>
+                  <p:par>
+                    <p:cTn id="8" fill="hold">
+                      <p:stCondLst>
+                        <p:cond delay="indefinite"/>
+                      </p:stCondLst>
+                      <p:childTnLst>
+                        <p:par>
+                          <p:cTn id="9" fill="hold">
+                            <p:stCondLst>
+                              <p:cond delay="0"/>
+                            </p:stCondLst>
+                            <p:childTnLst>
+                              <p:par>
+                                <p:cTn id="10" presetID="22" presetClass="exit" presetSubtype="2" fill="hold" nodeType="clickEffect">
+                                  <p:stCondLst>
+                                    <p:cond delay="0"/>
+                                  </p:stCondLst>
+                                  <p:childTnLst>
+                                    <p:animEffect transition="out" filter="wipe(right)">
+                                      <p:cBhvr>
+                                        <p:cTn id="11" dur="500"/>
+                                        <p:tgtEl>
+                                          <p:spTgt spid="30"/>
+                                        </p:tgtEl>
+                                      </p:cBhvr>
+                                    </p:animEffect>
+                                    <p:set>
+                                      <p:cBhvr>
+                                        <p:cTn id="12" dur="1" fill="hold">
+                                          <p:stCondLst>
+                                            <p:cond delay="499"/>
+                                          </p:stCondLst>
+                                        </p:cTn>
+                                        <p:tgtEl>
+                                          <p:spTgt spid="30"/>
+                                        </p:tgtEl>
+                                        <p:attrNameLst>
+                                          <p:attrName>style.visibility</p:attrName>
+                                        </p:attrNameLst>
+                                      </p:cBhvr>
+                                      <p:to>
+                                        <p:strVal val="hidden"/>
+                                      </p:to>
+                                    </p:set>
+                                  </p:childTnLst>
+                                </p:cTn>
+                              </p:par>
+                            </p:childTnLst>
+                          </p:cTn>
+                        </p:par>
+                      </p:childTnLst>
+                    </p:cTn>
+                  </p:par>
+                  <p:par>
+                    <p:cTn id="13" fill="hold">
+                      <p:stCondLst>
+                        <p:cond delay="indefinite"/>
+                      </p:stCondLst>
+                      <p:childTnLst>
+                        <p:par>
+                          <p:cTn id="14" fill="hold">
+                            <p:stCondLst>
+                              <p:cond delay="0"/>
+                            </p:stCondLst>
+                            <p:childTnLst>
+                              <p:par>
+                                <p:cTn id="15" presetID="10" presetClass="entr" presetSubtype="0" fill="hold" nodeType="clickEffect">
+                                  <p:stCondLst>
+                                    <p:cond delay="0"/>
+                                  </p:stCondLst>
+                                  <p:childTnLst>
+                                    <p:set>
+                                      <p:cBhvr>
+                                        <p:cTn id="16" dur="1" fill="hold">
+                                          <p:stCondLst>
+                                            <p:cond delay="0"/>
+                                          </p:stCondLst>
+                                        </p:cTn>
+                                        <p:tgtEl>
+                                          <p:spTgt spid="14"/>
+                                        </p:tgtEl>
+                                        <p:attrNameLst>
+                                          <p:attrName>style.visibility</p:attrName>
+                                        </p:attrNameLst>
+                                      </p:cBhvr>
+                                      <p:to>
+                                        <p:strVal val="visible"/>
+                                      </p:to>
+                                    </p:set>
+                                    <p:animEffect transition="in" filter="fade">
+                                      <p:cBhvr>
+                                        <p:cTn id="17" dur="500"/>
+                                        <p:tgtEl>
+                                          <p:spTgt spid="14"/>
+                                        </p:tgtEl>
+                                      </p:cBhvr>
+                                    </p:animEffect>
+                                  </p:childTnLst>
+                                </p:cTn>
+                              </p:par>
+                              <p:par>
+                                <p:cTn id="18" presetID="10" presetClass="entr" presetSubtype="0" fill="hold" nodeType="withEffect">
+                                  <p:stCondLst>
+                                    <p:cond delay="0"/>
+                                  </p:stCondLst>
+                                  <p:childTnLst>
+                                    <p:set>
+                                      <p:cBhvr>
+                                        <p:cTn id="19" dur="1" fill="hold">
+                                          <p:stCondLst>
+                                            <p:cond delay="0"/>
+                                          </p:stCondLst>
+                                        </p:cTn>
+                                        <p:tgtEl>
+                                          <p:spTgt spid="13"/>
+                                        </p:tgtEl>
+                                        <p:attrNameLst>
+                                          <p:attrName>style.visibility</p:attrName>
+                                        </p:attrNameLst>
+                                      </p:cBhvr>
+                                      <p:to>
+                                        <p:strVal val="visible"/>
+                                      </p:to>
+                                    </p:set>
+                                    <p:animEffect transition="in" filter="fade">
+                                      <p:cBhvr>
+                                        <p:cTn id="20" dur="500"/>
+                                        <p:tgtEl>
+                                          <p:spTgt spid="13"/>
+                                        </p:tgtEl>
+                                      </p:cBhvr>
+                                    </p:animEffect>
+                                  </p:childTnLst>
+                                </p:cTn>
+                              </p:par>
+                              <p:par>
+                                <p:cTn id="21" presetID="10" presetClass="entr" presetSubtype="0" fill="hold" nodeType="withEffect">
+                                  <p:stCondLst>
+                                    <p:cond delay="0"/>
+                                  </p:stCondLst>
+                                  <p:childTnLst>
+                                    <p:set>
+                                      <p:cBhvr>
+                                        <p:cTn id="22" dur="1" fill="hold">
+                                          <p:stCondLst>
+                                            <p:cond delay="0"/>
+                                          </p:stCondLst>
+                                        </p:cTn>
+                                        <p:tgtEl>
+                                          <p:spTgt spid="1028"/>
+                                        </p:tgtEl>
+                                        <p:attrNameLst>
+                                          <p:attrName>style.visibility</p:attrName>
+                                        </p:attrNameLst>
+                                      </p:cBhvr>
+                                      <p:to>
+                                        <p:strVal val="visible"/>
+                                      </p:to>
+                                    </p:set>
+                                    <p:animEffect transition="in" filter="fade">
+                                      <p:cBhvr>
+                                        <p:cTn id="23" dur="500"/>
+                                        <p:tgtEl>
+                                          <p:spTgt spid="1028"/>
+                                        </p:tgtEl>
+                                      </p:cBhvr>
+                                    </p:animEffect>
+                                  </p:childTnLst>
+                                </p:cTn>
+                              </p:par>
+                            </p:childTnLst>
+                          </p:cTn>
+                        </p:par>
+                      </p:childTnLst>
+                    </p:cTn>
+                  </p:par>
+                  <p:par>
+                    <p:cTn id="24" fill="hold">
+                      <p:stCondLst>
+                        <p:cond delay="indefinite"/>
+                      </p:stCondLst>
+                      <p:childTnLst>
+                        <p:par>
+                          <p:cTn id="25" fill="hold">
+                            <p:stCondLst>
+                              <p:cond delay="0"/>
+                            </p:stCondLst>
+                            <p:childTnLst>
+                              <p:par>
+                                <p:cTn id="26" presetID="22" presetClass="entr" presetSubtype="8" fill="hold" nodeType="clickEffect">
+                                  <p:stCondLst>
+                                    <p:cond delay="0"/>
+                                  </p:stCondLst>
+                                  <p:childTnLst>
+                                    <p:set>
+                                      <p:cBhvr>
+                                        <p:cTn id="27" dur="1" fill="hold">
+                                          <p:stCondLst>
+                                            <p:cond delay="0"/>
+                                          </p:stCondLst>
+                                        </p:cTn>
+                                        <p:tgtEl>
+                                          <p:spTgt spid="31"/>
+                                        </p:tgtEl>
+                                        <p:attrNameLst>
+                                          <p:attrName>style.visibility</p:attrName>
+                                        </p:attrNameLst>
+                                      </p:cBhvr>
+                                      <p:to>
+                                        <p:strVal val="visible"/>
+                                      </p:to>
+                                    </p:set>
+                                    <p:animEffect transition="in" filter="wipe(left)">
+                                      <p:cBhvr>
+                                        <p:cTn id="28" dur="500"/>
+                                        <p:tgtEl>
+                                          <p:spTgt spid="31"/>
+                                        </p:tgtEl>
+                                      </p:cBhvr>
+                                    </p:animEffect>
+                                  </p:childTnLst>
+                                </p:cTn>
+                              </p:par>
+                            </p:childTnLst>
+                          </p:cTn>
+                        </p:par>
+                      </p:childTnLst>
+                    </p:cTn>
+                  </p:par>
+                  <p:par>
+                    <p:cTn id="29" fill="hold">
+                      <p:stCondLst>
+                        <p:cond delay="indefinite"/>
+                      </p:stCondLst>
+                      <p:childTnLst>
+                        <p:par>
+                          <p:cTn id="30" fill="hold">
+                            <p:stCondLst>
+                              <p:cond delay="0"/>
+                            </p:stCondLst>
+                            <p:childTnLst>
+                              <p:par>
+                                <p:cTn id="31" presetID="22" presetClass="exit" presetSubtype="8" fill="hold" nodeType="clickEffect">
+                                  <p:stCondLst>
+                                    <p:cond delay="0"/>
+                                  </p:stCondLst>
+                                  <p:childTnLst>
+                                    <p:animEffect transition="out" filter="wipe(left)">
+                                      <p:cBhvr>
+                                        <p:cTn id="32" dur="500"/>
+                                        <p:tgtEl>
+                                          <p:spTgt spid="31"/>
+                                        </p:tgtEl>
+                                      </p:cBhvr>
+                                    </p:animEffect>
+                                    <p:set>
+                                      <p:cBhvr>
+                                        <p:cTn id="33" dur="1" fill="hold">
+                                          <p:stCondLst>
+                                            <p:cond delay="499"/>
+                                          </p:stCondLst>
+                                        </p:cTn>
+                                        <p:tgtEl>
+                                          <p:spTgt spid="31"/>
+                                        </p:tgtEl>
+                                        <p:attrNameLst>
+                                          <p:attrName>style.visibility</p:attrName>
+                                        </p:attrNameLst>
+                                      </p:cBhvr>
+                                      <p:to>
+                                        <p:strVal val="hidden"/>
+                                      </p:to>
+                                    </p:set>
+                                  </p:childTnLst>
+                                </p:cTn>
+                              </p:par>
+                            </p:childTnLst>
+                          </p:cTn>
+                        </p:par>
+                      </p:childTnLst>
+                    </p:cTn>
+                  </p:par>
+                  <p:par>
+                    <p:cTn id="34" fill="hold">
+                      <p:stCondLst>
+                        <p:cond delay="indefinite"/>
+                      </p:stCondLst>
+                      <p:childTnLst>
+                        <p:par>
+                          <p:cTn id="35" fill="hold">
+                            <p:stCondLst>
+                              <p:cond delay="0"/>
+                            </p:stCondLst>
+                            <p:childTnLst>
+                              <p:par>
+                                <p:cTn id="36" presetID="42" presetClass="path" presetSubtype="0" accel="50000" decel="50000" fill="hold" nodeType="clickEffect">
+                                  <p:stCondLst>
+                                    <p:cond delay="0"/>
+                                  </p:stCondLst>
+                                  <p:childTnLst>
+                                    <p:animMotion origin="layout" path="M -5.55556E-7 3.7037E-6 L 0.50504 0.10555 " pathEditMode="relative" rAng="0" ptsTypes="AA">
+                                      <p:cBhvr>
+                                        <p:cTn id="37" dur="1000" fill="hold"/>
+                                        <p:tgtEl>
+                                          <p:spTgt spid="14"/>
+                                        </p:tgtEl>
+                                        <p:attrNameLst>
+                                          <p:attrName>ppt_x</p:attrName>
+                                          <p:attrName>ppt_y</p:attrName>
+                                        </p:attrNameLst>
+                                      </p:cBhvr>
+                                      <p:rCtr x="25243" y="5278"/>
+                                    </p:animMotion>
+                                  </p:childTnLst>
+                                </p:cTn>
+                              </p:par>
+                              <p:par>
+                                <p:cTn id="38" presetID="42" presetClass="path" presetSubtype="0" accel="50000" decel="50000" fill="hold" nodeType="withEffect">
+                                  <p:stCondLst>
+                                    <p:cond delay="0"/>
+                                  </p:stCondLst>
+                                  <p:childTnLst>
+                                    <p:animMotion origin="layout" path="M -4.44444E-6 -3.33333E-6 L 0.54428 -0.09398 " pathEditMode="relative" rAng="0" ptsTypes="AA">
+                                      <p:cBhvr>
+                                        <p:cTn id="39" dur="1000" fill="hold"/>
+                                        <p:tgtEl>
+                                          <p:spTgt spid="13"/>
+                                        </p:tgtEl>
+                                        <p:attrNameLst>
+                                          <p:attrName>ppt_x</p:attrName>
+                                          <p:attrName>ppt_y</p:attrName>
+                                        </p:attrNameLst>
+                                      </p:cBhvr>
+                                      <p:rCtr x="27205" y="-4699"/>
+                                    </p:animMotion>
+                                  </p:childTnLst>
+                                </p:cTn>
+                              </p:par>
+                              <p:par>
+                                <p:cTn id="40" presetID="42" presetClass="path" presetSubtype="0" accel="50000" decel="50000" fill="hold" nodeType="withEffect">
+                                  <p:stCondLst>
+                                    <p:cond delay="0"/>
+                                  </p:stCondLst>
+                                  <p:childTnLst>
+                                    <p:animMotion origin="layout" path="M 0 -1.48148E-6 L 0.51372 -0.28171 " pathEditMode="relative" rAng="0" ptsTypes="AA">
+                                      <p:cBhvr>
+                                        <p:cTn id="41" dur="1000" fill="hold"/>
+                                        <p:tgtEl>
+                                          <p:spTgt spid="1028"/>
+                                        </p:tgtEl>
+                                        <p:attrNameLst>
+                                          <p:attrName>ppt_x</p:attrName>
+                                          <p:attrName>ppt_y</p:attrName>
+                                        </p:attrNameLst>
+                                      </p:cBhvr>
+                                      <p:rCtr x="25677" y="-14097"/>
+                                    </p:animMotion>
+                                  </p:childTnLst>
+                                </p:cTn>
+                              </p:par>
+                            </p:childTnLst>
+                          </p:cTn>
+                        </p:par>
+                      </p:childTnLst>
+                    </p:cTn>
+                  </p:par>
+                  <p:par>
+                    <p:cTn id="42" fill="hold">
+                      <p:stCondLst>
+                        <p:cond delay="indefinite"/>
+                      </p:stCondLst>
+                      <p:childTnLst>
+                        <p:par>
+                          <p:cTn id="43" fill="hold">
+                            <p:stCondLst>
+                              <p:cond delay="0"/>
+                            </p:stCondLst>
+                            <p:childTnLst>
+                              <p:par>
+                                <p:cTn id="44" presetID="10" presetClass="exit" presetSubtype="0" fill="hold" nodeType="clickEffect">
+                                  <p:stCondLst>
+                                    <p:cond delay="0"/>
+                                  </p:stCondLst>
+                                  <p:childTnLst>
+                                    <p:animEffect transition="out" filter="fade">
+                                      <p:cBhvr>
+                                        <p:cTn id="45" dur="500"/>
+                                        <p:tgtEl>
+                                          <p:spTgt spid="14"/>
+                                        </p:tgtEl>
+                                      </p:cBhvr>
+                                    </p:animEffect>
+                                    <p:set>
+                                      <p:cBhvr>
+                                        <p:cTn id="46" dur="1" fill="hold">
+                                          <p:stCondLst>
+                                            <p:cond delay="499"/>
+                                          </p:stCondLst>
+                                        </p:cTn>
+                                        <p:tgtEl>
+                                          <p:spTgt spid="14"/>
+                                        </p:tgtEl>
+                                        <p:attrNameLst>
+                                          <p:attrName>style.visibility</p:attrName>
+                                        </p:attrNameLst>
+                                      </p:cBhvr>
+                                      <p:to>
+                                        <p:strVal val="hidden"/>
+                                      </p:to>
+                                    </p:set>
+                                  </p:childTnLst>
+                                </p:cTn>
+                              </p:par>
+                              <p:par>
+                                <p:cTn id="47" presetID="10" presetClass="exit" presetSubtype="0" fill="hold" nodeType="withEffect">
+                                  <p:stCondLst>
+                                    <p:cond delay="0"/>
+                                  </p:stCondLst>
+                                  <p:childTnLst>
+                                    <p:animEffect transition="out" filter="fade">
+                                      <p:cBhvr>
+                                        <p:cTn id="48" dur="500"/>
+                                        <p:tgtEl>
+                                          <p:spTgt spid="13"/>
+                                        </p:tgtEl>
+                                      </p:cBhvr>
+                                    </p:animEffect>
+                                    <p:set>
+                                      <p:cBhvr>
+                                        <p:cTn id="49" dur="1" fill="hold">
+                                          <p:stCondLst>
+                                            <p:cond delay="499"/>
+                                          </p:stCondLst>
+                                        </p:cTn>
+                                        <p:tgtEl>
+                                          <p:spTgt spid="13"/>
+                                        </p:tgtEl>
+                                        <p:attrNameLst>
+                                          <p:attrName>style.visibility</p:attrName>
+                                        </p:attrNameLst>
+                                      </p:cBhvr>
+                                      <p:to>
+                                        <p:strVal val="hidden"/>
+                                      </p:to>
+                                    </p:set>
+                                  </p:childTnLst>
+                                </p:cTn>
+                              </p:par>
+                              <p:par>
+                                <p:cTn id="50" presetID="10" presetClass="exit" presetSubtype="0" fill="hold" nodeType="withEffect">
+                                  <p:stCondLst>
+                                    <p:cond delay="0"/>
+                                  </p:stCondLst>
+                                  <p:childTnLst>
+                                    <p:animEffect transition="out" filter="fade">
+                                      <p:cBhvr>
+                                        <p:cTn id="51" dur="500"/>
+                                        <p:tgtEl>
+                                          <p:spTgt spid="1028"/>
+                                        </p:tgtEl>
+                                      </p:cBhvr>
+                                    </p:animEffect>
+                                    <p:set>
+                                      <p:cBhvr>
+                                        <p:cTn id="52" dur="1" fill="hold">
+                                          <p:stCondLst>
+                                            <p:cond delay="499"/>
+                                          </p:stCondLst>
+                                        </p:cTn>
+                                        <p:tgtEl>
+                                          <p:spTgt spid="1028"/>
+                                        </p:tgtEl>
+                                        <p:attrNameLst>
+                                          <p:attrName>style.visibility</p:attrName>
+                                        </p:attrNameLst>
+                                      </p:cBhvr>
+                                      <p:to>
+                                        <p:strVal val="hidden"/>
+                                      </p:to>
+                                    </p:set>
+                                  </p:childTnLst>
+                                </p:cTn>
+                              </p:par>
+                              <p:par>
+                                <p:cTn id="53" presetID="10" presetClass="entr" presetSubtype="0" fill="hold" nodeType="withEffect">
+                                  <p:stCondLst>
+                                    <p:cond delay="0"/>
+                                  </p:stCondLst>
+                                  <p:childTnLst>
+                                    <p:set>
+                                      <p:cBhvr>
+                                        <p:cTn id="54" dur="1" fill="hold">
+                                          <p:stCondLst>
+                                            <p:cond delay="0"/>
+                                          </p:stCondLst>
+                                        </p:cTn>
+                                        <p:tgtEl>
+                                          <p:spTgt spid="36"/>
+                                        </p:tgtEl>
+                                        <p:attrNameLst>
+                                          <p:attrName>style.visibility</p:attrName>
+                                        </p:attrNameLst>
+                                      </p:cBhvr>
+                                      <p:to>
+                                        <p:strVal val="visible"/>
+                                      </p:to>
+                                    </p:set>
+                                    <p:animEffect transition="in" filter="fade">
+                                      <p:cBhvr>
+                                        <p:cTn id="55" dur="500"/>
+                                        <p:tgtEl>
+                                          <p:spTgt spid="36"/>
+                                        </p:tgtEl>
+                                      </p:cBhvr>
+                                    </p:animEffect>
+                                  </p:childTnLst>
+                                </p:cTn>
+                              </p:par>
+                            </p:childTnLst>
+                          </p:cTn>
+                        </p:par>
+                      </p:childTnLst>
+                    </p:cTn>
+                  </p:par>
+                  <p:par>
+                    <p:cTn id="56" fill="hold">
+                      <p:stCondLst>
+                        <p:cond delay="indefinite"/>
+                      </p:stCondLst>
+                      <p:childTnLst>
+                        <p:par>
+                          <p:cTn id="57" fill="hold">
+                            <p:stCondLst>
+                              <p:cond delay="0"/>
+                            </p:stCondLst>
+                            <p:childTnLst>
+                              <p:par>
+                                <p:cTn id="58" presetID="42" presetClass="path" presetSubtype="0" accel="50000" decel="50000" fill="hold" nodeType="clickEffect">
+                                  <p:stCondLst>
+                                    <p:cond delay="0"/>
+                                  </p:stCondLst>
+                                  <p:childTnLst>
+                                    <p:animMotion origin="layout" path="M 5E-6 3.33333E-6 L -0.2349 -0.17084 " pathEditMode="relative" rAng="0" ptsTypes="AA">
+                                      <p:cBhvr>
+                                        <p:cTn id="59" dur="1000" fill="hold"/>
+                                        <p:tgtEl>
+                                          <p:spTgt spid="36"/>
+                                        </p:tgtEl>
+                                        <p:attrNameLst>
+                                          <p:attrName>ppt_x</p:attrName>
+                                          <p:attrName>ppt_y</p:attrName>
+                                        </p:attrNameLst>
+                                      </p:cBhvr>
+                                      <p:rCtr x="-11753" y="-8542"/>
+                                    </p:animMotion>
+                                  </p:childTnLst>
+                                </p:cTn>
+                              </p:par>
+                            </p:childTnLst>
+                          </p:cTn>
+                        </p:par>
+                      </p:childTnLst>
+                    </p:cTn>
+                  </p:par>
+                </p:childTnLst>
+              </p:cTn>
+              <p:prevCondLst>
+                <p:cond evt="onPrev" delay="0">
+                  <p:tgtEl>
+                    <p:sldTgt/>
+                  </p:tgtEl>
+                </p:cond>
+              </p:prevCondLst>
+              <p:nextCondLst>
+                <p:cond evt="onNext" delay="0">
+                  <p:tgtEl>
+                    <p:sldTgt/>
+                  </p:tgtEl>
+                </p:cond>
+              </p:nextCondLst>
+            </p:seq>
+          </p:childTnLst>
+        </p:cTn>
+      </p:par>
+    </p:tnLst>
+  </p:timing>
 </p:sld>
 </file>
 
 <file path=ppt/slides/slide4.xml><?xml version="1.0" encoding="utf-8"?>
+<p:sld xmlns:a="http://schemas.openxmlformats.org/drawingml/2006/main" xmlns:r="http://schemas.openxmlformats.org/officeDocument/2006/relationships" xmlns:p="http://schemas.openxmlformats.org/presentationml/2006/main">
+  <p:cSld>
+    <p:spTree>
+      <p:nvGrpSpPr>
+        <p:cNvPr id="1" name=""/>
+        <p:cNvGrpSpPr/>
+        <p:nvPr/>
+      </p:nvGrpSpPr>
+      <p:grpSpPr>
+        <a:xfrm>
+          <a:off x="0" y="0"/>
+          <a:ext cx="0" cy="0"/>
+          <a:chOff x="0" y="0"/>
+          <a:chExt cx="0" cy="0"/>
+        </a:xfrm>
+      </p:grpSpPr>
+      <p:pic>
+        <p:nvPicPr>
+          <p:cNvPr id="2" name="Picture 2" descr="C:\Users\AKononov\Documents\GitHub\DocRefConsulter\logo_name.png"/>
+          <p:cNvPicPr>
+            <a:picLocks noChangeAspect="1" noChangeArrowheads="1"/>
+          </p:cNvPicPr>
+          <p:nvPr/>
+        </p:nvPicPr>
+        <p:blipFill>
+          <a:blip r:embed="rId2">
+            <a:extLst>
+              <a:ext uri="{28A0092B-C50C-407E-A947-70E740481C1C}">
+                <a14:useLocalDpi xmlns:a14="http://schemas.microsoft.com/office/drawing/2010/main" val="0"/>
+              </a:ext>
+            </a:extLst>
+          </a:blip>
+          <a:srcRect/>
+          <a:stretch>
+            <a:fillRect/>
+          </a:stretch>
+        </p:blipFill>
+        <p:spPr bwMode="auto">
+          <a:xfrm>
+            <a:off x="5846390" y="5856271"/>
+            <a:ext cx="3096964" cy="731240"/>
+          </a:xfrm>
+          <a:prstGeom prst="rect">
+            <a:avLst/>
+          </a:prstGeom>
+          <a:noFill/>
+          <a:extLst>
+            <a:ext uri="{909E8E84-426E-40DD-AFC4-6F175D3DCCD1}">
+              <a14:hiddenFill xmlns:a14="http://schemas.microsoft.com/office/drawing/2010/main">
+                <a:solidFill>
+                  <a:srgbClr val="FFFFFF"/>
+                </a:solidFill>
+              </a14:hiddenFill>
+            </a:ext>
+          </a:extLst>
+        </p:spPr>
+      </p:pic>
+      <p:pic>
+        <p:nvPicPr>
+          <p:cNvPr id="1026" name="Picture 2" descr="C:\Users\AKononov\Documents\GitHub\DocRefConsulter\user_logo.png"/>
+          <p:cNvPicPr>
+            <a:picLocks noChangeAspect="1" noChangeArrowheads="1"/>
+          </p:cNvPicPr>
+          <p:nvPr/>
+        </p:nvPicPr>
+        <p:blipFill>
+          <a:blip r:embed="rId3">
+            <a:extLst>
+              <a:ext uri="{28A0092B-C50C-407E-A947-70E740481C1C}">
+                <a14:useLocalDpi xmlns:a14="http://schemas.microsoft.com/office/drawing/2010/main" val="0"/>
+              </a:ext>
+            </a:extLst>
+          </a:blip>
+          <a:srcRect/>
+          <a:stretch>
+            <a:fillRect/>
+          </a:stretch>
+        </p:blipFill>
+        <p:spPr bwMode="auto">
+          <a:xfrm>
+            <a:off x="1475656" y="2996952"/>
+            <a:ext cx="438150" cy="904875"/>
+          </a:xfrm>
+          <a:prstGeom prst="rect">
+            <a:avLst/>
+          </a:prstGeom>
+          <a:noFill/>
+          <a:extLst>
+            <a:ext uri="{909E8E84-426E-40DD-AFC4-6F175D3DCCD1}">
+              <a14:hiddenFill xmlns:a14="http://schemas.microsoft.com/office/drawing/2010/main">
+                <a:solidFill>
+                  <a:srgbClr val="FFFFFF"/>
+                </a:solidFill>
+              </a14:hiddenFill>
+            </a:ext>
+          </a:extLst>
+        </p:spPr>
+      </p:pic>
+      <p:pic>
+        <p:nvPicPr>
+          <p:cNvPr id="10" name="Picture 2" descr="C:\Users\AKononov\Documents\GitHub\DocRefConsulter\user_logo.png"/>
+          <p:cNvPicPr>
+            <a:picLocks noChangeAspect="1" noChangeArrowheads="1"/>
+          </p:cNvPicPr>
+          <p:nvPr/>
+        </p:nvPicPr>
+        <p:blipFill>
+          <a:blip r:embed="rId3">
+            <a:extLst>
+              <a:ext uri="{28A0092B-C50C-407E-A947-70E740481C1C}">
+                <a14:useLocalDpi xmlns:a14="http://schemas.microsoft.com/office/drawing/2010/main" val="0"/>
+              </a:ext>
+            </a:extLst>
+          </a:blip>
+          <a:srcRect/>
+          <a:stretch>
+            <a:fillRect/>
+          </a:stretch>
+        </p:blipFill>
+        <p:spPr bwMode="auto">
+          <a:xfrm>
+            <a:off x="1844750" y="1556792"/>
+            <a:ext cx="438150" cy="904875"/>
+          </a:xfrm>
+          <a:prstGeom prst="rect">
+            <a:avLst/>
+          </a:prstGeom>
+          <a:noFill/>
+          <a:extLst>
+            <a:ext uri="{909E8E84-426E-40DD-AFC4-6F175D3DCCD1}">
+              <a14:hiddenFill xmlns:a14="http://schemas.microsoft.com/office/drawing/2010/main">
+                <a:solidFill>
+                  <a:srgbClr val="FFFFFF"/>
+                </a:solidFill>
+              </a14:hiddenFill>
+            </a:ext>
+          </a:extLst>
+        </p:spPr>
+      </p:pic>
+      <p:pic>
+        <p:nvPicPr>
+          <p:cNvPr id="11" name="Picture 2" descr="C:\Users\AKononov\Documents\GitHub\DocRefConsulter\user_logo.png"/>
+          <p:cNvPicPr>
+            <a:picLocks noChangeAspect="1" noChangeArrowheads="1"/>
+          </p:cNvPicPr>
+          <p:nvPr/>
+        </p:nvPicPr>
+        <p:blipFill>
+          <a:blip r:embed="rId3">
+            <a:extLst>
+              <a:ext uri="{28A0092B-C50C-407E-A947-70E740481C1C}">
+                <a14:useLocalDpi xmlns:a14="http://schemas.microsoft.com/office/drawing/2010/main" val="0"/>
+              </a:ext>
+            </a:extLst>
+          </a:blip>
+          <a:srcRect/>
+          <a:stretch>
+            <a:fillRect/>
+          </a:stretch>
+        </p:blipFill>
+        <p:spPr bwMode="auto">
+          <a:xfrm>
+            <a:off x="1804268" y="4365104"/>
+            <a:ext cx="438150" cy="904875"/>
+          </a:xfrm>
+          <a:prstGeom prst="rect">
+            <a:avLst/>
+          </a:prstGeom>
+          <a:noFill/>
+          <a:extLst>
+            <a:ext uri="{909E8E84-426E-40DD-AFC4-6F175D3DCCD1}">
+              <a14:hiddenFill xmlns:a14="http://schemas.microsoft.com/office/drawing/2010/main">
+                <a:solidFill>
+                  <a:srgbClr val="FFFFFF"/>
+                </a:solidFill>
+              </a14:hiddenFill>
+            </a:ext>
+          </a:extLst>
+        </p:spPr>
+      </p:pic>
+      <p:pic>
+        <p:nvPicPr>
+          <p:cNvPr id="1028" name="Picture 4" descr="C:\Users\AKononov\Documents\GitHub\DocRefConsulter\logo_scratch.png"/>
+          <p:cNvPicPr>
+            <a:picLocks noChangeAspect="1" noChangeArrowheads="1"/>
+          </p:cNvPicPr>
+          <p:nvPr/>
+        </p:nvPicPr>
+        <p:blipFill>
+          <a:blip r:embed="rId4" cstate="print">
+            <a:extLst>
+              <a:ext uri="{28A0092B-C50C-407E-A947-70E740481C1C}">
+                <a14:useLocalDpi xmlns:a14="http://schemas.microsoft.com/office/drawing/2010/main" val="0"/>
+              </a:ext>
+            </a:extLst>
+          </a:blip>
+          <a:srcRect/>
+          <a:stretch>
+            <a:fillRect/>
+          </a:stretch>
+        </p:blipFill>
+        <p:spPr bwMode="auto">
+          <a:xfrm>
+            <a:off x="2066876" y="4932697"/>
+            <a:ext cx="432048" cy="427167"/>
+          </a:xfrm>
+          <a:prstGeom prst="rect">
+            <a:avLst/>
+          </a:prstGeom>
+          <a:noFill/>
+          <a:extLst>
+            <a:ext uri="{909E8E84-426E-40DD-AFC4-6F175D3DCCD1}">
+              <a14:hiddenFill xmlns:a14="http://schemas.microsoft.com/office/drawing/2010/main">
+                <a:solidFill>
+                  <a:srgbClr val="FFFFFF"/>
+                </a:solidFill>
+              </a14:hiddenFill>
+            </a:ext>
+          </a:extLst>
+        </p:spPr>
+      </p:pic>
+      <p:pic>
+        <p:nvPicPr>
+          <p:cNvPr id="13" name="Picture 4" descr="C:\Users\AKononov\Documents\GitHub\DocRefConsulter\logo_scratch.png"/>
+          <p:cNvPicPr>
+            <a:picLocks noChangeAspect="1" noChangeArrowheads="1"/>
+          </p:cNvPicPr>
+          <p:nvPr/>
+        </p:nvPicPr>
+        <p:blipFill>
+          <a:blip r:embed="rId4" cstate="print">
+            <a:extLst>
+              <a:ext uri="{28A0092B-C50C-407E-A947-70E740481C1C}">
+                <a14:useLocalDpi xmlns:a14="http://schemas.microsoft.com/office/drawing/2010/main" val="0"/>
+              </a:ext>
+            </a:extLst>
+          </a:blip>
+          <a:srcRect/>
+          <a:stretch>
+            <a:fillRect/>
+          </a:stretch>
+        </p:blipFill>
+        <p:spPr bwMode="auto">
+          <a:xfrm>
+            <a:off x="1787228" y="3573016"/>
+            <a:ext cx="432048" cy="427167"/>
+          </a:xfrm>
+          <a:prstGeom prst="rect">
+            <a:avLst/>
+          </a:prstGeom>
+          <a:noFill/>
+          <a:extLst>
+            <a:ext uri="{909E8E84-426E-40DD-AFC4-6F175D3DCCD1}">
+              <a14:hiddenFill xmlns:a14="http://schemas.microsoft.com/office/drawing/2010/main">
+                <a:solidFill>
+                  <a:srgbClr val="FFFFFF"/>
+                </a:solidFill>
+              </a14:hiddenFill>
+            </a:ext>
+          </a:extLst>
+        </p:spPr>
+      </p:pic>
+      <p:pic>
+        <p:nvPicPr>
+          <p:cNvPr id="14" name="Picture 4" descr="C:\Users\AKononov\Documents\GitHub\DocRefConsulter\logo_scratch.png"/>
+          <p:cNvPicPr>
+            <a:picLocks noChangeAspect="1" noChangeArrowheads="1"/>
+          </p:cNvPicPr>
+          <p:nvPr/>
+        </p:nvPicPr>
+        <p:blipFill>
+          <a:blip r:embed="rId4" cstate="print">
+            <a:extLst>
+              <a:ext uri="{28A0092B-C50C-407E-A947-70E740481C1C}">
+                <a14:useLocalDpi xmlns:a14="http://schemas.microsoft.com/office/drawing/2010/main" val="0"/>
+              </a:ext>
+            </a:extLst>
+          </a:blip>
+          <a:srcRect/>
+          <a:stretch>
+            <a:fillRect/>
+          </a:stretch>
+        </p:blipFill>
+        <p:spPr bwMode="auto">
+          <a:xfrm>
+            <a:off x="2146127" y="2204864"/>
+            <a:ext cx="432048" cy="427167"/>
+          </a:xfrm>
+          <a:prstGeom prst="rect">
+            <a:avLst/>
+          </a:prstGeom>
+          <a:noFill/>
+          <a:extLst>
+            <a:ext uri="{909E8E84-426E-40DD-AFC4-6F175D3DCCD1}">
+              <a14:hiddenFill xmlns:a14="http://schemas.microsoft.com/office/drawing/2010/main">
+                <a:solidFill>
+                  <a:srgbClr val="FFFFFF"/>
+                </a:solidFill>
+              </a14:hiddenFill>
+            </a:ext>
+          </a:extLst>
+        </p:spPr>
+      </p:pic>
+      <p:pic>
+        <p:nvPicPr>
+          <p:cNvPr id="1029" name="Picture 5" descr="C:\Users\AKononov\Documents\GitHub\DocRefConsulter\db_logo.png"/>
+          <p:cNvPicPr>
+            <a:picLocks noChangeAspect="1" noChangeArrowheads="1"/>
+          </p:cNvPicPr>
+          <p:nvPr/>
+        </p:nvPicPr>
+        <p:blipFill>
+          <a:blip r:embed="rId5" cstate="print">
+            <a:extLst>
+              <a:ext uri="{28A0092B-C50C-407E-A947-70E740481C1C}">
+                <a14:useLocalDpi xmlns:a14="http://schemas.microsoft.com/office/drawing/2010/main" val="0"/>
+              </a:ext>
+            </a:extLst>
+          </a:blip>
+          <a:srcRect/>
+          <a:stretch>
+            <a:fillRect/>
+          </a:stretch>
+        </p:blipFill>
+        <p:spPr bwMode="auto">
+          <a:xfrm>
+            <a:off x="6620570" y="2780928"/>
+            <a:ext cx="918370" cy="918370"/>
+          </a:xfrm>
+          <a:prstGeom prst="rect">
+            <a:avLst/>
+          </a:prstGeom>
+          <a:noFill/>
+          <a:extLst>
+            <a:ext uri="{909E8E84-426E-40DD-AFC4-6F175D3DCCD1}">
+              <a14:hiddenFill xmlns:a14="http://schemas.microsoft.com/office/drawing/2010/main">
+                <a:solidFill>
+                  <a:srgbClr val="FFFFFF"/>
+                </a:solidFill>
+              </a14:hiddenFill>
+            </a:ext>
+          </a:extLst>
+        </p:spPr>
+      </p:pic>
+      <p:grpSp>
+        <p:nvGrpSpPr>
+          <p:cNvPr id="31" name="Group 30"/>
+          <p:cNvGrpSpPr/>
+          <p:nvPr/>
+        </p:nvGrpSpPr>
+        <p:grpSpPr>
+          <a:xfrm>
+            <a:off x="2498924" y="2132856"/>
+            <a:ext cx="4121646" cy="3013424"/>
+            <a:chOff x="1530474" y="2132856"/>
+            <a:chExt cx="4121646" cy="3013424"/>
+          </a:xfrm>
+        </p:grpSpPr>
+        <p:cxnSp>
+          <p:nvCxnSpPr>
+            <p:cNvPr id="17" name="Straight Arrow Connector 16"/>
+            <p:cNvCxnSpPr/>
+            <p:nvPr/>
+          </p:nvCxnSpPr>
+          <p:spPr>
+            <a:xfrm flipV="1">
+              <a:off x="1726994" y="3690144"/>
+              <a:ext cx="3925126" cy="1456136"/>
+            </a:xfrm>
+            <a:prstGeom prst="straightConnector1">
+              <a:avLst/>
+            </a:prstGeom>
+            <a:ln w="38100">
+              <a:tailEnd type="arrow"/>
+            </a:ln>
+          </p:spPr>
+          <p:style>
+            <a:lnRef idx="1">
+              <a:schemeClr val="dk1"/>
+            </a:lnRef>
+            <a:fillRef idx="0">
+              <a:schemeClr val="dk1"/>
+            </a:fillRef>
+            <a:effectRef idx="0">
+              <a:schemeClr val="dk1"/>
+            </a:effectRef>
+            <a:fontRef idx="minor">
+              <a:schemeClr val="tx1"/>
+            </a:fontRef>
+          </p:style>
+        </p:cxnSp>
+        <p:cxnSp>
+          <p:nvCxnSpPr>
+            <p:cNvPr id="27" name="Straight Arrow Connector 26"/>
+            <p:cNvCxnSpPr/>
+            <p:nvPr/>
+          </p:nvCxnSpPr>
+          <p:spPr>
+            <a:xfrm flipV="1">
+              <a:off x="1530474" y="3356992"/>
+              <a:ext cx="3761606" cy="288032"/>
+            </a:xfrm>
+            <a:prstGeom prst="straightConnector1">
+              <a:avLst/>
+            </a:prstGeom>
+            <a:ln w="38100">
+              <a:solidFill>
+                <a:schemeClr val="tx1"/>
+              </a:solidFill>
+              <a:tailEnd type="arrow"/>
+            </a:ln>
+          </p:spPr>
+          <p:style>
+            <a:lnRef idx="1">
+              <a:schemeClr val="accent1"/>
+            </a:lnRef>
+            <a:fillRef idx="0">
+              <a:schemeClr val="accent1"/>
+            </a:fillRef>
+            <a:effectRef idx="0">
+              <a:schemeClr val="accent1"/>
+            </a:effectRef>
+            <a:fontRef idx="minor">
+              <a:schemeClr val="tx1"/>
+            </a:fontRef>
+          </p:style>
+        </p:cxnSp>
+        <p:cxnSp>
+          <p:nvCxnSpPr>
+            <p:cNvPr id="33" name="Straight Arrow Connector 32"/>
+            <p:cNvCxnSpPr/>
+            <p:nvPr/>
+          </p:nvCxnSpPr>
+          <p:spPr>
+            <a:xfrm>
+              <a:off x="1763688" y="2132856"/>
+              <a:ext cx="3600400" cy="864096"/>
+            </a:xfrm>
+            <a:prstGeom prst="straightConnector1">
+              <a:avLst/>
+            </a:prstGeom>
+            <a:ln w="38100">
+              <a:solidFill>
+                <a:schemeClr val="tx1"/>
+              </a:solidFill>
+              <a:tailEnd type="arrow"/>
+            </a:ln>
+          </p:spPr>
+          <p:style>
+            <a:lnRef idx="1">
+              <a:schemeClr val="accent1"/>
+            </a:lnRef>
+            <a:fillRef idx="0">
+              <a:schemeClr val="accent1"/>
+            </a:fillRef>
+            <a:effectRef idx="0">
+              <a:schemeClr val="accent1"/>
+            </a:effectRef>
+            <a:fontRef idx="minor">
+              <a:schemeClr val="tx1"/>
+            </a:fontRef>
+          </p:style>
+        </p:cxnSp>
+      </p:grpSp>
+      <p:grpSp>
+        <p:nvGrpSpPr>
+          <p:cNvPr id="4" name="Group 3"/>
+          <p:cNvGrpSpPr/>
+          <p:nvPr/>
+        </p:nvGrpSpPr>
+        <p:grpSpPr>
+          <a:xfrm>
+            <a:off x="4144007" y="841117"/>
+            <a:ext cx="620452" cy="620452"/>
+            <a:chOff x="5846390" y="709352"/>
+            <a:chExt cx="620452" cy="620452"/>
+          </a:xfrm>
+        </p:grpSpPr>
+        <p:sp>
+          <p:nvSpPr>
+            <p:cNvPr id="3" name="Rectangle 2"/>
+            <p:cNvSpPr/>
+            <p:nvPr/>
+          </p:nvSpPr>
+          <p:spPr>
+            <a:xfrm>
+              <a:off x="5868144" y="764704"/>
+              <a:ext cx="576064" cy="504056"/>
+            </a:xfrm>
+            <a:prstGeom prst="rect">
+              <a:avLst/>
+            </a:prstGeom>
+            <a:solidFill>
+              <a:schemeClr val="accent3">
+                <a:lumMod val="60000"/>
+                <a:lumOff val="40000"/>
+              </a:schemeClr>
+            </a:solidFill>
+            <a:ln>
+              <a:noFill/>
+            </a:ln>
+          </p:spPr>
+          <p:style>
+            <a:lnRef idx="2">
+              <a:schemeClr val="accent1">
+                <a:shade val="50000"/>
+              </a:schemeClr>
+            </a:lnRef>
+            <a:fillRef idx="1">
+              <a:schemeClr val="accent1"/>
+            </a:fillRef>
+            <a:effectRef idx="0">
+              <a:schemeClr val="accent1"/>
+            </a:effectRef>
+            <a:fontRef idx="minor">
+              <a:schemeClr val="lt1"/>
+            </a:fontRef>
+          </p:style>
+          <p:txBody>
+            <a:bodyPr rtlCol="0" anchor="ctr"/>
+            <a:lstStyle/>
+            <a:p>
+              <a:pPr algn="ctr"/>
+              <a:endParaRPr lang="en-GB"/>
+            </a:p>
+          </p:txBody>
+        </p:sp>
+        <p:pic>
+          <p:nvPicPr>
+            <p:cNvPr id="26" name="Picture 6" descr="C:\Users\AKononov\Documents\GitHub\DocRefConsulter\browser-window-vector-7.png"/>
+            <p:cNvPicPr>
+              <a:picLocks noChangeAspect="1" noChangeArrowheads="1"/>
+            </p:cNvPicPr>
+            <p:nvPr/>
+          </p:nvPicPr>
+          <p:blipFill>
+            <a:blip r:embed="rId6" cstate="print">
+              <a:extLst>
+                <a:ext uri="{28A0092B-C50C-407E-A947-70E740481C1C}">
+                  <a14:useLocalDpi xmlns:a14="http://schemas.microsoft.com/office/drawing/2010/main" val="0"/>
+                </a:ext>
+              </a:extLst>
+            </a:blip>
+            <a:srcRect/>
+            <a:stretch>
+              <a:fillRect/>
+            </a:stretch>
+          </p:blipFill>
+          <p:spPr bwMode="auto">
+            <a:xfrm>
+              <a:off x="5846390" y="709352"/>
+              <a:ext cx="620452" cy="620452"/>
+            </a:xfrm>
+            <a:prstGeom prst="rect">
+              <a:avLst/>
+            </a:prstGeom>
+            <a:noFill/>
+            <a:extLst>
+              <a:ext uri="{909E8E84-426E-40DD-AFC4-6F175D3DCCD1}">
+                <a14:hiddenFill xmlns:a14="http://schemas.microsoft.com/office/drawing/2010/main">
+                  <a:solidFill>
+                    <a:srgbClr val="FFFFFF"/>
+                  </a:solidFill>
+                </a14:hiddenFill>
+              </a:ext>
+            </a:extLst>
+          </p:spPr>
+        </p:pic>
+      </p:grpSp>
+      <p:grpSp>
+        <p:nvGrpSpPr>
+          <p:cNvPr id="5" name="Group 4"/>
+          <p:cNvGrpSpPr/>
+          <p:nvPr/>
+        </p:nvGrpSpPr>
+        <p:grpSpPr>
+          <a:xfrm>
+            <a:off x="4258116" y="988648"/>
+            <a:ext cx="620452" cy="620452"/>
+            <a:chOff x="6603008" y="856060"/>
+            <a:chExt cx="620452" cy="620452"/>
+          </a:xfrm>
+        </p:grpSpPr>
+        <p:sp>
+          <p:nvSpPr>
+            <p:cNvPr id="29" name="Rectangle 28"/>
+            <p:cNvSpPr/>
+            <p:nvPr/>
+          </p:nvSpPr>
+          <p:spPr>
+            <a:xfrm>
+              <a:off x="6638684" y="914258"/>
+              <a:ext cx="576064" cy="504056"/>
+            </a:xfrm>
+            <a:prstGeom prst="rect">
+              <a:avLst/>
+            </a:prstGeom>
+            <a:solidFill>
+              <a:schemeClr val="accent2">
+                <a:lumMod val="60000"/>
+                <a:lumOff val="40000"/>
+              </a:schemeClr>
+            </a:solidFill>
+            <a:ln>
+              <a:noFill/>
+            </a:ln>
+          </p:spPr>
+          <p:style>
+            <a:lnRef idx="2">
+              <a:schemeClr val="accent1">
+                <a:shade val="50000"/>
+              </a:schemeClr>
+            </a:lnRef>
+            <a:fillRef idx="1">
+              <a:schemeClr val="accent1"/>
+            </a:fillRef>
+            <a:effectRef idx="0">
+              <a:schemeClr val="accent1"/>
+            </a:effectRef>
+            <a:fontRef idx="minor">
+              <a:schemeClr val="lt1"/>
+            </a:fontRef>
+          </p:style>
+          <p:txBody>
+            <a:bodyPr rtlCol="0" anchor="ctr"/>
+            <a:lstStyle/>
+            <a:p>
+              <a:pPr algn="ctr"/>
+              <a:endParaRPr lang="en-GB"/>
+            </a:p>
+          </p:txBody>
+        </p:sp>
+        <p:pic>
+          <p:nvPicPr>
+            <p:cNvPr id="32" name="Picture 6" descr="C:\Users\AKononov\Documents\GitHub\DocRefConsulter\browser-window-vector-7.png"/>
+            <p:cNvPicPr>
+              <a:picLocks noChangeAspect="1" noChangeArrowheads="1"/>
+            </p:cNvPicPr>
+            <p:nvPr/>
+          </p:nvPicPr>
+          <p:blipFill>
+            <a:blip r:embed="rId6" cstate="print">
+              <a:extLst>
+                <a:ext uri="{28A0092B-C50C-407E-A947-70E740481C1C}">
+                  <a14:useLocalDpi xmlns:a14="http://schemas.microsoft.com/office/drawing/2010/main" val="0"/>
+                </a:ext>
+              </a:extLst>
+            </a:blip>
+            <a:srcRect/>
+            <a:stretch>
+              <a:fillRect/>
+            </a:stretch>
+          </p:blipFill>
+          <p:spPr bwMode="auto">
+            <a:xfrm>
+              <a:off x="6603008" y="856060"/>
+              <a:ext cx="620452" cy="620452"/>
+            </a:xfrm>
+            <a:prstGeom prst="rect">
+              <a:avLst/>
+            </a:prstGeom>
+            <a:noFill/>
+            <a:extLst>
+              <a:ext uri="{909E8E84-426E-40DD-AFC4-6F175D3DCCD1}">
+                <a14:hiddenFill xmlns:a14="http://schemas.microsoft.com/office/drawing/2010/main">
+                  <a:solidFill>
+                    <a:srgbClr val="FFFFFF"/>
+                  </a:solidFill>
+                </a14:hiddenFill>
+              </a:ext>
+            </a:extLst>
+          </p:spPr>
+        </p:pic>
+      </p:grpSp>
+      <p:grpSp>
+        <p:nvGrpSpPr>
+          <p:cNvPr id="6" name="Group 5"/>
+          <p:cNvGrpSpPr/>
+          <p:nvPr/>
+        </p:nvGrpSpPr>
+        <p:grpSpPr>
+          <a:xfrm>
+            <a:off x="4389842" y="1090299"/>
+            <a:ext cx="620452" cy="620452"/>
+            <a:chOff x="7387030" y="994538"/>
+            <a:chExt cx="620452" cy="620452"/>
+          </a:xfrm>
+        </p:grpSpPr>
+        <p:sp>
+          <p:nvSpPr>
+            <p:cNvPr id="34" name="Rectangle 33"/>
+            <p:cNvSpPr/>
+            <p:nvPr/>
+          </p:nvSpPr>
+          <p:spPr>
+            <a:xfrm>
+              <a:off x="7409224" y="1063812"/>
+              <a:ext cx="576064" cy="504056"/>
+            </a:xfrm>
+            <a:prstGeom prst="rect">
+              <a:avLst/>
+            </a:prstGeom>
+            <a:solidFill>
+              <a:schemeClr val="accent1">
+                <a:lumMod val="60000"/>
+                <a:lumOff val="40000"/>
+              </a:schemeClr>
+            </a:solidFill>
+            <a:ln>
+              <a:noFill/>
+            </a:ln>
+          </p:spPr>
+          <p:style>
+            <a:lnRef idx="2">
+              <a:schemeClr val="accent1">
+                <a:shade val="50000"/>
+              </a:schemeClr>
+            </a:lnRef>
+            <a:fillRef idx="1">
+              <a:schemeClr val="accent1"/>
+            </a:fillRef>
+            <a:effectRef idx="0">
+              <a:schemeClr val="accent1"/>
+            </a:effectRef>
+            <a:fontRef idx="minor">
+              <a:schemeClr val="lt1"/>
+            </a:fontRef>
+          </p:style>
+          <p:txBody>
+            <a:bodyPr rtlCol="0" anchor="ctr"/>
+            <a:lstStyle/>
+            <a:p>
+              <a:pPr algn="ctr"/>
+              <a:endParaRPr lang="en-GB"/>
+            </a:p>
+          </p:txBody>
+        </p:sp>
+        <p:pic>
+          <p:nvPicPr>
+            <p:cNvPr id="35" name="Picture 6" descr="C:\Users\AKononov\Documents\GitHub\DocRefConsulter\browser-window-vector-7.png"/>
+            <p:cNvPicPr>
+              <a:picLocks noChangeAspect="1" noChangeArrowheads="1"/>
+            </p:cNvPicPr>
+            <p:nvPr/>
+          </p:nvPicPr>
+          <p:blipFill>
+            <a:blip r:embed="rId6" cstate="print">
+              <a:extLst>
+                <a:ext uri="{28A0092B-C50C-407E-A947-70E740481C1C}">
+                  <a14:useLocalDpi xmlns:a14="http://schemas.microsoft.com/office/drawing/2010/main" val="0"/>
+                </a:ext>
+              </a:extLst>
+            </a:blip>
+            <a:srcRect/>
+            <a:stretch>
+              <a:fillRect/>
+            </a:stretch>
+          </p:blipFill>
+          <p:spPr bwMode="auto">
+            <a:xfrm>
+              <a:off x="7387030" y="994538"/>
+              <a:ext cx="620452" cy="620452"/>
+            </a:xfrm>
+            <a:prstGeom prst="rect">
+              <a:avLst/>
+            </a:prstGeom>
+            <a:noFill/>
+            <a:extLst>
+              <a:ext uri="{909E8E84-426E-40DD-AFC4-6F175D3DCCD1}">
+                <a14:hiddenFill xmlns:a14="http://schemas.microsoft.com/office/drawing/2010/main">
+                  <a:solidFill>
+                    <a:srgbClr val="FFFFFF"/>
+                  </a:solidFill>
+                </a14:hiddenFill>
+              </a:ext>
+            </a:extLst>
+          </p:spPr>
+        </p:pic>
+      </p:grpSp>
+      <p:pic>
+        <p:nvPicPr>
+          <p:cNvPr id="36" name="Picture 4" descr="C:\Users\AKononov\Documents\GitHub\DocRefConsulter\logo_scratch.png"/>
+          <p:cNvPicPr>
+            <a:picLocks noChangeAspect="1" noChangeArrowheads="1"/>
+          </p:cNvPicPr>
+          <p:nvPr/>
+        </p:nvPicPr>
+        <p:blipFill>
+          <a:blip r:embed="rId7" cstate="print">
+            <a:extLst>
+              <a:ext uri="{28A0092B-C50C-407E-A947-70E740481C1C}">
+                <a14:useLocalDpi xmlns:a14="http://schemas.microsoft.com/office/drawing/2010/main" val="0"/>
+              </a:ext>
+            </a:extLst>
+          </a:blip>
+          <a:srcRect/>
+          <a:stretch>
+            <a:fillRect/>
+          </a:stretch>
+        </p:blipFill>
+        <p:spPr bwMode="auto">
+          <a:xfrm>
+            <a:off x="5034508" y="1178750"/>
+            <a:ext cx="400570" cy="396044"/>
+          </a:xfrm>
+          <a:prstGeom prst="rect">
+            <a:avLst/>
+          </a:prstGeom>
+          <a:noFill/>
+          <a:extLst>
+            <a:ext uri="{909E8E84-426E-40DD-AFC4-6F175D3DCCD1}">
+              <a14:hiddenFill xmlns:a14="http://schemas.microsoft.com/office/drawing/2010/main">
+                <a:solidFill>
+                  <a:srgbClr val="FFFFFF"/>
+                </a:solidFill>
+              </a14:hiddenFill>
+            </a:ext>
+          </a:extLst>
+        </p:spPr>
+      </p:pic>
+      <p:cxnSp>
+        <p:nvCxnSpPr>
+          <p:cNvPr id="8" name="Straight Arrow Connector 7"/>
+          <p:cNvCxnSpPr/>
+          <p:nvPr/>
+        </p:nvCxnSpPr>
+        <p:spPr>
+          <a:xfrm flipH="1" flipV="1">
+            <a:off x="5508104" y="1550902"/>
+            <a:ext cx="1080120" cy="1158018"/>
+          </a:xfrm>
+          <a:prstGeom prst="straightConnector1">
+            <a:avLst/>
+          </a:prstGeom>
+          <a:ln w="38100">
+            <a:tailEnd type="arrow"/>
+          </a:ln>
+        </p:spPr>
+        <p:style>
+          <a:lnRef idx="1">
+            <a:schemeClr val="dk1"/>
+          </a:lnRef>
+          <a:fillRef idx="0">
+            <a:schemeClr val="dk1"/>
+          </a:fillRef>
+          <a:effectRef idx="0">
+            <a:schemeClr val="dk1"/>
+          </a:effectRef>
+          <a:fontRef idx="minor">
+            <a:schemeClr val="tx1"/>
+          </a:fontRef>
+        </p:style>
+      </p:cxnSp>
+    </p:spTree>
+    <p:extLst>
+      <p:ext uri="{BB962C8B-B14F-4D97-AF65-F5344CB8AC3E}">
+        <p14:creationId xmlns:p14="http://schemas.microsoft.com/office/powerpoint/2010/main" val="873755952"/>
+      </p:ext>
+    </p:extLst>
+  </p:cSld>
+  <p:clrMapOvr>
+    <a:masterClrMapping/>
+  </p:clrMapOvr>
+  <p:timing>
+    <p:tnLst>
+      <p:par>
+        <p:cTn id="1" dur="indefinite" restart="never" nodeType="tmRoot">
+          <p:childTnLst>
+            <p:seq concurrent="1" nextAc="seek">
+              <p:cTn id="2" dur="indefinite" nodeType="mainSeq">
+                <p:childTnLst>
+                  <p:par>
+                    <p:cTn id="3" fill="hold">
+                      <p:stCondLst>
+                        <p:cond delay="indefinite"/>
+                      </p:stCondLst>
+                      <p:childTnLst>
+                        <p:par>
+                          <p:cTn id="4" fill="hold">
+                            <p:stCondLst>
+                              <p:cond delay="0"/>
+                            </p:stCondLst>
+                            <p:childTnLst>
+                              <p:par>
+                                <p:cTn id="5" presetID="22" presetClass="entr" presetSubtype="8" fill="hold" nodeType="clickEffect">
+                                  <p:stCondLst>
+                                    <p:cond delay="0"/>
+                                  </p:stCondLst>
+                                  <p:childTnLst>
+                                    <p:set>
+                                      <p:cBhvr>
+                                        <p:cTn id="6" dur="1" fill="hold">
+                                          <p:stCondLst>
+                                            <p:cond delay="0"/>
+                                          </p:stCondLst>
+                                        </p:cTn>
+                                        <p:tgtEl>
+                                          <p:spTgt spid="31"/>
+                                        </p:tgtEl>
+                                        <p:attrNameLst>
+                                          <p:attrName>style.visibility</p:attrName>
+                                        </p:attrNameLst>
+                                      </p:cBhvr>
+                                      <p:to>
+                                        <p:strVal val="visible"/>
+                                      </p:to>
+                                    </p:set>
+                                    <p:animEffect transition="in" filter="wipe(left)">
+                                      <p:cBhvr>
+                                        <p:cTn id="7" dur="500"/>
+                                        <p:tgtEl>
+                                          <p:spTgt spid="31"/>
+                                        </p:tgtEl>
+                                      </p:cBhvr>
+                                    </p:animEffect>
+                                  </p:childTnLst>
+                                </p:cTn>
+                              </p:par>
+                            </p:childTnLst>
+                          </p:cTn>
+                        </p:par>
+                      </p:childTnLst>
+                    </p:cTn>
+                  </p:par>
+                  <p:par>
+                    <p:cTn id="8" fill="hold">
+                      <p:stCondLst>
+                        <p:cond delay="indefinite"/>
+                      </p:stCondLst>
+                      <p:childTnLst>
+                        <p:par>
+                          <p:cTn id="9" fill="hold">
+                            <p:stCondLst>
+                              <p:cond delay="0"/>
+                            </p:stCondLst>
+                            <p:childTnLst>
+                              <p:par>
+                                <p:cTn id="10" presetID="22" presetClass="exit" presetSubtype="8" fill="hold" nodeType="clickEffect">
+                                  <p:stCondLst>
+                                    <p:cond delay="0"/>
+                                  </p:stCondLst>
+                                  <p:childTnLst>
+                                    <p:animEffect transition="out" filter="wipe(left)">
+                                      <p:cBhvr>
+                                        <p:cTn id="11" dur="500"/>
+                                        <p:tgtEl>
+                                          <p:spTgt spid="31"/>
+                                        </p:tgtEl>
+                                      </p:cBhvr>
+                                    </p:animEffect>
+                                    <p:set>
+                                      <p:cBhvr>
+                                        <p:cTn id="12" dur="1" fill="hold">
+                                          <p:stCondLst>
+                                            <p:cond delay="499"/>
+                                          </p:stCondLst>
+                                        </p:cTn>
+                                        <p:tgtEl>
+                                          <p:spTgt spid="31"/>
+                                        </p:tgtEl>
+                                        <p:attrNameLst>
+                                          <p:attrName>style.visibility</p:attrName>
+                                        </p:attrNameLst>
+                                      </p:cBhvr>
+                                      <p:to>
+                                        <p:strVal val="hidden"/>
+                                      </p:to>
+                                    </p:set>
+                                  </p:childTnLst>
+                                </p:cTn>
+                              </p:par>
+                            </p:childTnLst>
+                          </p:cTn>
+                        </p:par>
+                      </p:childTnLst>
+                    </p:cTn>
+                  </p:par>
+                  <p:par>
+                    <p:cTn id="13" fill="hold">
+                      <p:stCondLst>
+                        <p:cond delay="indefinite"/>
+                      </p:stCondLst>
+                      <p:childTnLst>
+                        <p:par>
+                          <p:cTn id="14" fill="hold">
+                            <p:stCondLst>
+                              <p:cond delay="0"/>
+                            </p:stCondLst>
+                            <p:childTnLst>
+                              <p:par>
+                                <p:cTn id="15" presetID="42" presetClass="path" presetSubtype="0" accel="50000" decel="50000" fill="hold" nodeType="clickEffect">
+                                  <p:stCondLst>
+                                    <p:cond delay="0"/>
+                                  </p:stCondLst>
+                                  <p:childTnLst>
+                                    <p:animMotion origin="layout" path="M -5.55556E-7 3.7037E-6 L 0.50504 0.10555 " pathEditMode="relative" rAng="0" ptsTypes="AA">
+                                      <p:cBhvr>
+                                        <p:cTn id="16" dur="1000" fill="hold"/>
+                                        <p:tgtEl>
+                                          <p:spTgt spid="14"/>
+                                        </p:tgtEl>
+                                        <p:attrNameLst>
+                                          <p:attrName>ppt_x</p:attrName>
+                                          <p:attrName>ppt_y</p:attrName>
+                                        </p:attrNameLst>
+                                      </p:cBhvr>
+                                      <p:rCtr x="25243" y="5278"/>
+                                    </p:animMotion>
+                                  </p:childTnLst>
+                                </p:cTn>
+                              </p:par>
+                              <p:par>
+                                <p:cTn id="17" presetID="42" presetClass="path" presetSubtype="0" accel="50000" decel="50000" fill="hold" nodeType="withEffect">
+                                  <p:stCondLst>
+                                    <p:cond delay="0"/>
+                                  </p:stCondLst>
+                                  <p:childTnLst>
+                                    <p:animMotion origin="layout" path="M -4.44444E-6 -3.33333E-6 L 0.54428 -0.09398 " pathEditMode="relative" rAng="0" ptsTypes="AA">
+                                      <p:cBhvr>
+                                        <p:cTn id="18" dur="1000" fill="hold"/>
+                                        <p:tgtEl>
+                                          <p:spTgt spid="13"/>
+                                        </p:tgtEl>
+                                        <p:attrNameLst>
+                                          <p:attrName>ppt_x</p:attrName>
+                                          <p:attrName>ppt_y</p:attrName>
+                                        </p:attrNameLst>
+                                      </p:cBhvr>
+                                      <p:rCtr x="27205" y="-4699"/>
+                                    </p:animMotion>
+                                  </p:childTnLst>
+                                </p:cTn>
+                              </p:par>
+                              <p:par>
+                                <p:cTn id="19" presetID="42" presetClass="path" presetSubtype="0" accel="50000" decel="50000" fill="hold" nodeType="withEffect">
+                                  <p:stCondLst>
+                                    <p:cond delay="0"/>
+                                  </p:stCondLst>
+                                  <p:childTnLst>
+                                    <p:animMotion origin="layout" path="M 0 -1.48148E-6 L 0.51372 -0.28171 " pathEditMode="relative" rAng="0" ptsTypes="AA">
+                                      <p:cBhvr>
+                                        <p:cTn id="20" dur="1000" fill="hold"/>
+                                        <p:tgtEl>
+                                          <p:spTgt spid="1028"/>
+                                        </p:tgtEl>
+                                        <p:attrNameLst>
+                                          <p:attrName>ppt_x</p:attrName>
+                                          <p:attrName>ppt_y</p:attrName>
+                                        </p:attrNameLst>
+                                      </p:cBhvr>
+                                      <p:rCtr x="25677" y="-14097"/>
+                                    </p:animMotion>
+                                  </p:childTnLst>
+                                </p:cTn>
+                              </p:par>
+                            </p:childTnLst>
+                          </p:cTn>
+                        </p:par>
+                      </p:childTnLst>
+                    </p:cTn>
+                  </p:par>
+                  <p:par>
+                    <p:cTn id="21" fill="hold">
+                      <p:stCondLst>
+                        <p:cond delay="indefinite"/>
+                      </p:stCondLst>
+                      <p:childTnLst>
+                        <p:par>
+                          <p:cTn id="22" fill="hold">
+                            <p:stCondLst>
+                              <p:cond delay="0"/>
+                            </p:stCondLst>
+                            <p:childTnLst>
+                              <p:par>
+                                <p:cTn id="23" presetID="10" presetClass="exit" presetSubtype="0" fill="hold" nodeType="clickEffect">
+                                  <p:stCondLst>
+                                    <p:cond delay="0"/>
+                                  </p:stCondLst>
+                                  <p:childTnLst>
+                                    <p:animEffect transition="out" filter="fade">
+                                      <p:cBhvr>
+                                        <p:cTn id="24" dur="500"/>
+                                        <p:tgtEl>
+                                          <p:spTgt spid="14"/>
+                                        </p:tgtEl>
+                                      </p:cBhvr>
+                                    </p:animEffect>
+                                    <p:set>
+                                      <p:cBhvr>
+                                        <p:cTn id="25" dur="1" fill="hold">
+                                          <p:stCondLst>
+                                            <p:cond delay="499"/>
+                                          </p:stCondLst>
+                                        </p:cTn>
+                                        <p:tgtEl>
+                                          <p:spTgt spid="14"/>
+                                        </p:tgtEl>
+                                        <p:attrNameLst>
+                                          <p:attrName>style.visibility</p:attrName>
+                                        </p:attrNameLst>
+                                      </p:cBhvr>
+                                      <p:to>
+                                        <p:strVal val="hidden"/>
+                                      </p:to>
+                                    </p:set>
+                                  </p:childTnLst>
+                                </p:cTn>
+                              </p:par>
+                              <p:par>
+                                <p:cTn id="26" presetID="10" presetClass="exit" presetSubtype="0" fill="hold" nodeType="withEffect">
+                                  <p:stCondLst>
+                                    <p:cond delay="0"/>
+                                  </p:stCondLst>
+                                  <p:childTnLst>
+                                    <p:animEffect transition="out" filter="fade">
+                                      <p:cBhvr>
+                                        <p:cTn id="27" dur="500"/>
+                                        <p:tgtEl>
+                                          <p:spTgt spid="13"/>
+                                        </p:tgtEl>
+                                      </p:cBhvr>
+                                    </p:animEffect>
+                                    <p:set>
+                                      <p:cBhvr>
+                                        <p:cTn id="28" dur="1" fill="hold">
+                                          <p:stCondLst>
+                                            <p:cond delay="499"/>
+                                          </p:stCondLst>
+                                        </p:cTn>
+                                        <p:tgtEl>
+                                          <p:spTgt spid="13"/>
+                                        </p:tgtEl>
+                                        <p:attrNameLst>
+                                          <p:attrName>style.visibility</p:attrName>
+                                        </p:attrNameLst>
+                                      </p:cBhvr>
+                                      <p:to>
+                                        <p:strVal val="hidden"/>
+                                      </p:to>
+                                    </p:set>
+                                  </p:childTnLst>
+                                </p:cTn>
+                              </p:par>
+                              <p:par>
+                                <p:cTn id="29" presetID="10" presetClass="exit" presetSubtype="0" fill="hold" nodeType="withEffect">
+                                  <p:stCondLst>
+                                    <p:cond delay="0"/>
+                                  </p:stCondLst>
+                                  <p:childTnLst>
+                                    <p:animEffect transition="out" filter="fade">
+                                      <p:cBhvr>
+                                        <p:cTn id="30" dur="500"/>
+                                        <p:tgtEl>
+                                          <p:spTgt spid="1028"/>
+                                        </p:tgtEl>
+                                      </p:cBhvr>
+                                    </p:animEffect>
+                                    <p:set>
+                                      <p:cBhvr>
+                                        <p:cTn id="31" dur="1" fill="hold">
+                                          <p:stCondLst>
+                                            <p:cond delay="499"/>
+                                          </p:stCondLst>
+                                        </p:cTn>
+                                        <p:tgtEl>
+                                          <p:spTgt spid="1028"/>
+                                        </p:tgtEl>
+                                        <p:attrNameLst>
+                                          <p:attrName>style.visibility</p:attrName>
+                                        </p:attrNameLst>
+                                      </p:cBhvr>
+                                      <p:to>
+                                        <p:strVal val="hidden"/>
+                                      </p:to>
+                                    </p:set>
+                                  </p:childTnLst>
+                                </p:cTn>
+                              </p:par>
+                            </p:childTnLst>
+                          </p:cTn>
+                        </p:par>
+                      </p:childTnLst>
+                    </p:cTn>
+                  </p:par>
+                  <p:par>
+                    <p:cTn id="32" fill="hold">
+                      <p:stCondLst>
+                        <p:cond delay="indefinite"/>
+                      </p:stCondLst>
+                      <p:childTnLst>
+                        <p:par>
+                          <p:cTn id="33" fill="hold">
+                            <p:stCondLst>
+                              <p:cond delay="0"/>
+                            </p:stCondLst>
+                            <p:childTnLst>
+                              <p:par>
+                                <p:cTn id="34" presetID="22" presetClass="entr" presetSubtype="4" fill="hold" nodeType="clickEffect">
+                                  <p:stCondLst>
+                                    <p:cond delay="0"/>
+                                  </p:stCondLst>
+                                  <p:childTnLst>
+                                    <p:set>
+                                      <p:cBhvr>
+                                        <p:cTn id="35" dur="1" fill="hold">
+                                          <p:stCondLst>
+                                            <p:cond delay="0"/>
+                                          </p:stCondLst>
+                                        </p:cTn>
+                                        <p:tgtEl>
+                                          <p:spTgt spid="8"/>
+                                        </p:tgtEl>
+                                        <p:attrNameLst>
+                                          <p:attrName>style.visibility</p:attrName>
+                                        </p:attrNameLst>
+                                      </p:cBhvr>
+                                      <p:to>
+                                        <p:strVal val="visible"/>
+                                      </p:to>
+                                    </p:set>
+                                    <p:animEffect transition="in" filter="wipe(down)">
+                                      <p:cBhvr>
+                                        <p:cTn id="36" dur="500"/>
+                                        <p:tgtEl>
+                                          <p:spTgt spid="8"/>
+                                        </p:tgtEl>
+                                      </p:cBhvr>
+                                    </p:animEffect>
+                                  </p:childTnLst>
+                                </p:cTn>
+                              </p:par>
+                            </p:childTnLst>
+                          </p:cTn>
+                        </p:par>
+                      </p:childTnLst>
+                    </p:cTn>
+                  </p:par>
+                  <p:par>
+                    <p:cTn id="37" fill="hold">
+                      <p:stCondLst>
+                        <p:cond delay="indefinite"/>
+                      </p:stCondLst>
+                      <p:childTnLst>
+                        <p:par>
+                          <p:cTn id="38" fill="hold">
+                            <p:stCondLst>
+                              <p:cond delay="0"/>
+                            </p:stCondLst>
+                            <p:childTnLst>
+                              <p:par>
+                                <p:cTn id="39" presetID="42" presetClass="path" presetSubtype="0" accel="50000" decel="50000" fill="hold" nodeType="clickEffect">
+                                  <p:stCondLst>
+                                    <p:cond delay="0"/>
+                                  </p:stCondLst>
+                                  <p:childTnLst>
+                                    <p:animMotion origin="layout" path="M 8.33333E-7 -4.07407E-6 L -0.16024 0.12223 " pathEditMode="relative" rAng="0" ptsTypes="AA">
+                                      <p:cBhvr>
+                                        <p:cTn id="40" dur="2000" fill="hold"/>
+                                        <p:tgtEl>
+                                          <p:spTgt spid="4"/>
+                                        </p:tgtEl>
+                                        <p:attrNameLst>
+                                          <p:attrName>ppt_x</p:attrName>
+                                          <p:attrName>ppt_y</p:attrName>
+                                        </p:attrNameLst>
+                                      </p:cBhvr>
+                                      <p:rCtr x="-8021" y="6111"/>
+                                    </p:animMotion>
+                                  </p:childTnLst>
+                                </p:cTn>
+                              </p:par>
+                              <p:par>
+                                <p:cTn id="41" presetID="42" presetClass="path" presetSubtype="0" accel="50000" decel="50000" fill="hold" nodeType="withEffect">
+                                  <p:stCondLst>
+                                    <p:cond delay="0"/>
+                                  </p:stCondLst>
+                                  <p:childTnLst>
+                                    <p:animMotion origin="layout" path="M 8.33333E-7 -1.85185E-6 L -0.18854 0.32107 " pathEditMode="relative" rAng="0" ptsTypes="AA">
+                                      <p:cBhvr>
+                                        <p:cTn id="42" dur="2000" fill="hold"/>
+                                        <p:tgtEl>
+                                          <p:spTgt spid="5"/>
+                                        </p:tgtEl>
+                                        <p:attrNameLst>
+                                          <p:attrName>ppt_x</p:attrName>
+                                          <p:attrName>ppt_y</p:attrName>
+                                        </p:attrNameLst>
+                                      </p:cBhvr>
+                                      <p:rCtr x="-9427" y="16042"/>
+                                    </p:animMotion>
+                                  </p:childTnLst>
+                                </p:cTn>
+                              </p:par>
+                              <p:par>
+                                <p:cTn id="43" presetID="42" presetClass="path" presetSubtype="0" accel="50000" decel="50000" fill="hold" nodeType="withEffect">
+                                  <p:stCondLst>
+                                    <p:cond delay="0"/>
+                                  </p:stCondLst>
+                                  <p:childTnLst>
+                                    <p:animMotion origin="layout" path="M 1.38889E-6 1.48148E-6 L -0.18906 0.48287 " pathEditMode="relative" rAng="0" ptsTypes="AA">
+                                      <p:cBhvr>
+                                        <p:cTn id="44" dur="2000" fill="hold"/>
+                                        <p:tgtEl>
+                                          <p:spTgt spid="6"/>
+                                        </p:tgtEl>
+                                        <p:attrNameLst>
+                                          <p:attrName>ppt_x</p:attrName>
+                                          <p:attrName>ppt_y</p:attrName>
+                                        </p:attrNameLst>
+                                      </p:cBhvr>
+                                      <p:rCtr x="-9462" y="24144"/>
+                                    </p:animMotion>
+                                  </p:childTnLst>
+                                </p:cTn>
+                              </p:par>
+                            </p:childTnLst>
+                          </p:cTn>
+                        </p:par>
+                      </p:childTnLst>
+                    </p:cTn>
+                  </p:par>
+                </p:childTnLst>
+              </p:cTn>
+              <p:prevCondLst>
+                <p:cond evt="onPrev" delay="0">
+                  <p:tgtEl>
+                    <p:sldTgt/>
+                  </p:tgtEl>
+                </p:cond>
+              </p:prevCondLst>
+              <p:nextCondLst>
+                <p:cond evt="onNext" delay="0">
+                  <p:tgtEl>
+                    <p:sldTgt/>
+                  </p:tgtEl>
+                </p:cond>
+              </p:nextCondLst>
+            </p:seq>
+          </p:childTnLst>
+        </p:cTn>
+      </p:par>
+    </p:tnLst>
+  </p:timing>
+</p:sld>
+</file>
+
+<file path=ppt/slides/slide5.xml><?xml version="1.0" encoding="utf-8"?>
 <p:sld xmlns:a="http://schemas.openxmlformats.org/drawingml/2006/main" xmlns:r="http://schemas.openxmlformats.org/officeDocument/2006/relationships" xmlns:p="http://schemas.openxmlformats.org/presentationml/2006/main">
   <p:cSld>
     <p:spTree>
@@ -3571,6 +6216,13 @@
   <p:clrMapOvr>
     <a:masterClrMapping/>
   </p:clrMapOvr>
+  <p:timing>
+    <p:tnLst>
+      <p:par>
+        <p:cTn id="1" dur="indefinite" restart="never" nodeType="tmRoot"/>
+      </p:par>
+    </p:tnLst>
+  </p:timing>
 </p:sld>
 </file>
 

</xml_diff>